<commit_message>
Update PowerPoint test files
</commit_message>
<xml_diff>
--- a/testing_debug/test_files_symbol_equation_bug/4_0123-45-67_replace_slide_just_add_symbol_ascii_utf8.pptx
+++ b/testing_debug/test_files_symbol_equation_bug/4_0123-45-67_replace_slide_just_add_symbol_ascii_utf8.pptx
@@ -150,7 +150,7 @@
       </p14:sectionLst>
     </p:ext>
     <p:ext uri="{EFAFB233-063F-42B5-8137-9DF3F51BA10A}">
-      <p15:sldGuideLst xmlns:p15="http://schemas.microsoft.com/office/powerpoint/2012/main" xmlns="">
+      <p15:sldGuideLst xmlns="" xmlns:p15="http://schemas.microsoft.com/office/powerpoint/2012/main">
         <p15:guide id="1" orient="horz" pos="921">
           <p15:clr>
             <a:srgbClr val="A4A3A4"/>
@@ -164,7 +164,7 @@
       </p15:sldGuideLst>
     </p:ext>
     <p:ext uri="{2D200454-40CA-4A62-9FC3-DE9A4176ACB9}">
-      <p15:notesGuideLst xmlns:p15="http://schemas.microsoft.com/office/powerpoint/2012/main" xmlns="">
+      <p15:notesGuideLst xmlns="" xmlns:p15="http://schemas.microsoft.com/office/powerpoint/2012/main">
         <p15:guide id="1" orient="horz" pos="2880">
           <p15:clr>
             <a:srgbClr val="A4A3A4"/>
@@ -2482,7 +2482,41 @@
                 <a:ea typeface="+mn-ea"/>
                 <a:cs typeface="Book Antiqua"/>
               </a:rPr>
-              <a:t>emigrate – leave one nation to move to another. mandate – an order putting a nation in charge of managing another nation. </a:t>
+              <a:t>emigrate – leave one nation to move to </a:t>
+            </a:r>
+            <a:r>
+              <a:rPr kumimoji="0" lang="en-US" sz="800" b="0" i="0" u="none" strike="noStrike" kern="1200" cap="none" spc="0" normalizeH="0" baseline="0" noProof="0" dirty="0" smtClean="0">
+                <a:ln>
+                  <a:noFill/>
+                </a:ln>
+                <a:solidFill>
+                  <a:prstClr val="black"/>
+                </a:solidFill>
+                <a:effectLst/>
+                <a:uLnTx/>
+                <a:uFillTx/>
+                <a:latin typeface="Book Antiqua"/>
+                <a:ea typeface="+mn-ea"/>
+                <a:cs typeface="Book Antiqua"/>
+              </a:rPr>
+              <a:t>another.</a:t>
+            </a:r>
+            <a:r>
+              <a:rPr kumimoji="0" lang="en-US" sz="800" b="0" i="0" u="none" strike="noStrike" kern="1200" cap="none" spc="0" normalizeH="0" baseline="0" noProof="0" dirty="0" smtClean="0">
+                <a:ln>
+                  <a:noFill/>
+                </a:ln>
+                <a:solidFill>
+                  <a:prstClr val="black"/>
+                </a:solidFill>
+                <a:effectLst/>
+                <a:uLnTx/>
+                <a:uFillTx/>
+                <a:latin typeface="Arial Unicode MS"/>
+                <a:ea typeface="Arial Unicode MS"/>
+                <a:cs typeface="Arial Unicode MS"/>
+              </a:rPr>
+              <a:t> </a:t>
             </a:r>
             <a:r>
               <a:rPr kumimoji="0" lang="en-US" sz="800" b="0" i="0" u="none" strike="noStrike" kern="1200" cap="none" spc="0" normalizeH="0" baseline="0" noProof="0" dirty="0" err="1" smtClean="0">
@@ -2594,6 +2628,110 @@
                   <a:noFill/>
                 </a:ln>
                 <a:solidFill>
+                  <a:prstClr val="black"/>
+                </a:solidFill>
+                <a:effectLst/>
+                <a:uLnTx/>
+                <a:uFillTx/>
+                <a:latin typeface="Book Antiqua"/>
+                <a:ea typeface="+mn-ea"/>
+                <a:cs typeface="Book Antiqua"/>
+              </a:rPr>
+              <a:t>mandate </a:t>
+            </a:r>
+            <a:r>
+              <a:rPr kumimoji="0" lang="en-US" sz="800" b="0" i="0" u="none" strike="noStrike" kern="1200" cap="none" spc="0" normalizeH="0" baseline="0" noProof="0" dirty="0" smtClean="0">
+                <a:ln>
+                  <a:noFill/>
+                </a:ln>
+                <a:solidFill>
+                  <a:prstClr val="black"/>
+                </a:solidFill>
+                <a:effectLst/>
+                <a:uLnTx/>
+                <a:uFillTx/>
+                <a:latin typeface="Book Antiqua"/>
+                <a:ea typeface="+mn-ea"/>
+                <a:cs typeface="Book Antiqua"/>
+              </a:rPr>
+              <a:t>– an order putting a nation in charge of managing another nation. </a:t>
+            </a:r>
+            <a:r>
+              <a:rPr kumimoji="0" lang="en-US" sz="800" b="0" i="0" u="none" strike="noStrike" kern="1200" cap="none" spc="0" normalizeH="0" baseline="0" noProof="0" dirty="0" smtClean="0">
+                <a:ln>
+                  <a:noFill/>
+                </a:ln>
+                <a:solidFill>
+                  <a:prstClr val="black"/>
+                </a:solidFill>
+                <a:effectLst/>
+                <a:uLnTx/>
+                <a:uFillTx/>
+                <a:latin typeface="Book Antiqua"/>
+                <a:ea typeface="+mn-ea"/>
+                <a:cs typeface="Book Antiqua"/>
+              </a:rPr>
+              <a:t>˜˚˘˛(Spacing Modifier Letters) </a:t>
+            </a:r>
+            <a:r>
+              <a:rPr kumimoji="0" lang="en-US" sz="800" b="0" i="0" u="none" strike="noStrike" kern="1200" cap="none" spc="0" normalizeH="0" baseline="0" noProof="0" dirty="0" err="1" smtClean="0">
+                <a:ln>
+                  <a:noFill/>
+                </a:ln>
+                <a:solidFill>
+                  <a:prstClr val="black"/>
+                </a:solidFill>
+                <a:effectLst/>
+                <a:uLnTx/>
+                <a:uFillTx/>
+                <a:latin typeface="Book Antiqua"/>
+                <a:ea typeface="+mn-ea"/>
+                <a:cs typeface="Book Antiqua"/>
+              </a:rPr>
+              <a:t>ẀẁỳẄ</a:t>
+            </a:r>
+            <a:r>
+              <a:rPr kumimoji="0" lang="en-US" sz="800" b="0" i="0" u="none" strike="noStrike" kern="1200" cap="none" spc="0" normalizeH="0" baseline="0" noProof="0" dirty="0" smtClean="0">
+                <a:ln>
+                  <a:noFill/>
+                </a:ln>
+                <a:solidFill>
+                  <a:prstClr val="black"/>
+                </a:solidFill>
+                <a:effectLst/>
+                <a:uLnTx/>
+                <a:uFillTx/>
+                <a:latin typeface="Book Antiqua"/>
+                <a:ea typeface="+mn-ea"/>
+                <a:cs typeface="Book Antiqua"/>
+              </a:rPr>
+              <a:t> (Latin Extended Additional)</a:t>
+            </a:r>
+          </a:p>
+          <a:p>
+            <a:pPr marL="0" marR="0" lvl="0" indent="0" algn="l" defTabSz="464424" rtl="0" eaLnBrk="1" fontAlgn="auto" latinLnBrk="0" hangingPunct="1">
+              <a:lnSpc>
+                <a:spcPct val="100000"/>
+              </a:lnSpc>
+              <a:spcBef>
+                <a:spcPts val="0"/>
+              </a:spcBef>
+              <a:spcAft>
+                <a:spcPts val="0"/>
+              </a:spcAft>
+              <a:buClrTx/>
+              <a:buSzTx/>
+              <a:buFont typeface="Arial" pitchFamily="34" charset="0"/>
+              <a:buNone/>
+              <a:tabLst/>
+              <a:defRPr/>
+            </a:pPr>
+            <a:r>
+              <a:rPr kumimoji="0" lang="en-US" sz="800" b="0" i="0" u="none" strike="noStrike" kern="1200" cap="none" spc="0" normalizeH="0" baseline="0" noProof="0" dirty="0" smtClean="0">
+                <a:ln>
+                  <a:noFill/>
+                </a:ln>
+                <a:solidFill>
                   <a:srgbClr val="4BACC6"/>
                 </a:solidFill>
                 <a:effectLst/>
@@ -2637,10 +2775,10 @@
                 <a:ea typeface="+mn-ea"/>
                 <a:cs typeface="Book Antiqua"/>
               </a:rPr>
-              <a:t>– the act of dividing something. Zionism – a political movement dedicated to the establishment and maintenance of a Jewish state in Palestine. ˜˚˘˛(Spacing Modifier Letters) </a:t>
-            </a:r>
-            <a:r>
-              <a:rPr kumimoji="0" lang="en-US" sz="800" b="0" i="0" u="none" strike="noStrike" kern="1200" cap="none" spc="0" normalizeH="0" baseline="0" noProof="0" dirty="0" err="1" smtClean="0">
+              <a:t>– the act of dividing </a:t>
+            </a:r>
+            <a:r>
+              <a:rPr kumimoji="0" lang="en-US" sz="800" b="0" i="0" u="none" strike="noStrike" kern="1200" cap="none" spc="0" normalizeH="0" baseline="0" noProof="0" dirty="0" smtClean="0">
                 <a:ln>
                   <a:noFill/>
                 </a:ln>
@@ -2654,8 +2792,58 @@
                 <a:ea typeface="+mn-ea"/>
                 <a:cs typeface="Book Antiqua"/>
               </a:rPr>
-              <a:t>ẀẁỳẄ</a:t>
-            </a:r>
+              <a:t>something. </a:t>
+            </a:r>
+            <a:r>
+              <a:rPr kumimoji="0" lang="en-US" sz="800" b="0" i="0" u="none" strike="noStrike" kern="1200" cap="none" spc="0" normalizeH="0" baseline="0" noProof="0" dirty="0" smtClean="0">
+                <a:ln>
+                  <a:noFill/>
+                </a:ln>
+                <a:solidFill>
+                  <a:prstClr val="black"/>
+                </a:solidFill>
+                <a:effectLst/>
+                <a:uLnTx/>
+                <a:uFillTx/>
+                <a:latin typeface="Arial Unicode MS"/>
+                <a:ea typeface="Arial Unicode MS"/>
+                <a:cs typeface="Arial Unicode MS"/>
+              </a:rPr>
+              <a:t>{@}} (Basic Latin) §¶ÅÃ (Latin-1 Supplement)</a:t>
+            </a:r>
+            <a:endParaRPr kumimoji="0" lang="en-US" sz="800" b="0" i="0" u="none" strike="noStrike" kern="1200" cap="none" spc="0" normalizeH="0" baseline="0" noProof="0" dirty="0" smtClean="0">
+              <a:ln>
+                <a:noFill/>
+              </a:ln>
+              <a:solidFill>
+                <a:prstClr val="black"/>
+              </a:solidFill>
+              <a:effectLst/>
+              <a:uLnTx/>
+              <a:uFillTx/>
+              <a:latin typeface="Book Antiqua"/>
+              <a:ea typeface="+mn-ea"/>
+              <a:cs typeface="Book Antiqua"/>
+            </a:endParaRPr>
+          </a:p>
+          <a:p>
+            <a:pPr marL="0" marR="0" lvl="0" indent="0" algn="l" defTabSz="464424" rtl="0" eaLnBrk="1" fontAlgn="auto" latinLnBrk="0" hangingPunct="1">
+              <a:lnSpc>
+                <a:spcPct val="100000"/>
+              </a:lnSpc>
+              <a:spcBef>
+                <a:spcPts val="0"/>
+              </a:spcBef>
+              <a:spcAft>
+                <a:spcPts val="0"/>
+              </a:spcAft>
+              <a:buClrTx/>
+              <a:buSzTx/>
+              <a:buFont typeface="Arial" pitchFamily="34" charset="0"/>
+              <a:buNone/>
+              <a:tabLst/>
+              <a:defRPr/>
+            </a:pPr>
             <a:r>
               <a:rPr kumimoji="0" lang="en-US" sz="800" b="0" i="0" u="none" strike="noStrike" kern="1200" cap="none" spc="0" normalizeH="0" baseline="0" noProof="0" dirty="0" smtClean="0">
                 <a:ln>
@@ -2671,10 +2859,10 @@
                 <a:ea typeface="+mn-ea"/>
                 <a:cs typeface="Book Antiqua"/>
               </a:rPr>
-              <a:t> (Latin </a:t>
-            </a:r>
-            <a:r>
-              <a:rPr kumimoji="0" lang="en-US" sz="800" b="0" i="0" u="none" strike="noStrike" kern="1200" cap="none" spc="0" normalizeH="0" baseline="0" noProof="0" smtClean="0">
+              <a:t>Zionism </a:t>
+            </a:r>
+            <a:r>
+              <a:rPr kumimoji="0" lang="en-US" sz="800" b="0" i="0" u="none" strike="noStrike" kern="1200" cap="none" spc="0" normalizeH="0" baseline="0" noProof="0" dirty="0" smtClean="0">
                 <a:ln>
                   <a:noFill/>
                 </a:ln>
@@ -2688,8 +2876,305 @@
                 <a:ea typeface="+mn-ea"/>
                 <a:cs typeface="Book Antiqua"/>
               </a:rPr>
-              <a:t>Extended Additional)</a:t>
-            </a:r>
+              <a:t>– a political movement dedicated to the establishment and maintenance of a Jewish state in </a:t>
+            </a:r>
+            <a:r>
+              <a:rPr kumimoji="0" lang="en-US" sz="800" b="0" i="0" u="none" strike="noStrike" kern="1200" cap="none" spc="0" normalizeH="0" baseline="0" noProof="0" dirty="0" smtClean="0">
+                <a:ln>
+                  <a:noFill/>
+                </a:ln>
+                <a:solidFill>
+                  <a:prstClr val="black"/>
+                </a:solidFill>
+                <a:effectLst/>
+                <a:uLnTx/>
+                <a:uFillTx/>
+                <a:latin typeface="Book Antiqua"/>
+                <a:ea typeface="+mn-ea"/>
+                <a:cs typeface="Book Antiqua"/>
+              </a:rPr>
+              <a:t>Palestine.</a:t>
+            </a:r>
+            <a:r>
+              <a:rPr kumimoji="0" lang="en-US" sz="800" b="0" i="0" u="none" strike="noStrike" kern="1200" cap="none" spc="0" normalizeH="0" baseline="0" noProof="0" dirty="0" smtClean="0">
+                <a:ln>
+                  <a:noFill/>
+                </a:ln>
+                <a:solidFill>
+                  <a:prstClr val="black"/>
+                </a:solidFill>
+                <a:effectLst/>
+                <a:uLnTx/>
+                <a:uFillTx/>
+                <a:latin typeface="Arial Unicode MS"/>
+                <a:ea typeface="Arial Unicode MS"/>
+                <a:cs typeface="Arial Unicode MS"/>
+              </a:rPr>
+              <a:t> </a:t>
+            </a:r>
+            <a:r>
+              <a:rPr kumimoji="0" lang="en-US" sz="800" b="0" i="0" u="none" strike="noStrike" kern="1200" cap="none" spc="0" normalizeH="0" baseline="0" noProof="0" dirty="0" err="1" smtClean="0">
+                <a:ln>
+                  <a:noFill/>
+                </a:ln>
+                <a:solidFill>
+                  <a:prstClr val="black"/>
+                </a:solidFill>
+                <a:effectLst/>
+                <a:uLnTx/>
+                <a:uFillTx/>
+                <a:latin typeface="Arial Unicode MS"/>
+                <a:ea typeface="Arial Unicode MS"/>
+                <a:cs typeface="Arial Unicode MS"/>
+              </a:rPr>
+              <a:t>Ħæę</a:t>
+            </a:r>
+            <a:r>
+              <a:rPr kumimoji="0" lang="hu-HU" sz="800" b="0" i="0" u="none" strike="noStrike" kern="1200" cap="none" spc="0" normalizeH="0" baseline="0" noProof="0" dirty="0" smtClean="0">
+                <a:ln>
+                  <a:noFill/>
+                </a:ln>
+                <a:solidFill>
+                  <a:prstClr val="black"/>
+                </a:solidFill>
+                <a:effectLst/>
+                <a:uLnTx/>
+                <a:uFillTx/>
+                <a:latin typeface="Arial Unicode MS"/>
+                <a:ea typeface="Arial Unicode MS"/>
+                <a:cs typeface="Arial Unicode MS"/>
+              </a:rPr>
+              <a:t>ű</a:t>
+            </a:r>
+            <a:r>
+              <a:rPr kumimoji="0" lang="en-US" sz="800" b="0" i="0" u="none" strike="noStrike" kern="1200" cap="none" spc="0" normalizeH="0" baseline="0" noProof="0" dirty="0" smtClean="0">
+                <a:ln>
+                  <a:noFill/>
+                </a:ln>
+                <a:solidFill>
+                  <a:prstClr val="black"/>
+                </a:solidFill>
+                <a:effectLst/>
+                <a:uLnTx/>
+                <a:uFillTx/>
+                <a:latin typeface="Arial Unicode MS"/>
+                <a:ea typeface="Arial Unicode MS"/>
+                <a:cs typeface="Arial Unicode MS"/>
+              </a:rPr>
+              <a:t> (Latin Extended-A) </a:t>
+            </a:r>
+            <a:r>
+              <a:rPr kumimoji="0" lang="en-US" sz="800" b="0" i="0" u="none" strike="noStrike" kern="1200" cap="none" spc="0" normalizeH="0" baseline="0" noProof="0" dirty="0" err="1" smtClean="0">
+                <a:ln>
+                  <a:noFill/>
+                </a:ln>
+                <a:solidFill>
+                  <a:prstClr val="black"/>
+                </a:solidFill>
+                <a:effectLst/>
+                <a:uLnTx/>
+                <a:uFillTx/>
+                <a:latin typeface="Book Antiqua"/>
+                <a:ea typeface="+mn-ea"/>
+                <a:cs typeface="Book Antiqua"/>
+              </a:rPr>
+              <a:t>ǼǽǾ</a:t>
+            </a:r>
+            <a:r>
+              <a:rPr kumimoji="0" lang="en-US" sz="800" b="0" i="0" u="none" strike="noStrike" kern="1200" cap="none" spc="0" normalizeH="0" baseline="0" noProof="0" dirty="0" smtClean="0">
+                <a:ln>
+                  <a:noFill/>
+                </a:ln>
+                <a:solidFill>
+                  <a:prstClr val="black"/>
+                </a:solidFill>
+                <a:effectLst/>
+                <a:uLnTx/>
+                <a:uFillTx/>
+                <a:latin typeface="Book Antiqua"/>
+                <a:ea typeface="+mn-ea"/>
+                <a:cs typeface="Book Antiqua"/>
+              </a:rPr>
+              <a:t> (Latin Extended-B)</a:t>
+            </a:r>
+          </a:p>
+          <a:p>
+            <a:pPr marL="0" marR="0" lvl="0" indent="0" algn="l" defTabSz="464424" rtl="0" eaLnBrk="1" fontAlgn="auto" latinLnBrk="0" hangingPunct="1">
+              <a:lnSpc>
+                <a:spcPct val="100000"/>
+              </a:lnSpc>
+              <a:spcBef>
+                <a:spcPts val="0"/>
+              </a:spcBef>
+              <a:spcAft>
+                <a:spcPts val="0"/>
+              </a:spcAft>
+              <a:buClrTx/>
+              <a:buSzTx/>
+              <a:buFont typeface="Arial" pitchFamily="34" charset="0"/>
+              <a:buNone/>
+              <a:tabLst/>
+              <a:defRPr/>
+            </a:pPr>
+            <a:r>
+              <a:rPr kumimoji="0" lang="en-US" sz="800" b="0" i="0" u="none" strike="noStrike" kern="1200" cap="none" spc="0" normalizeH="0" baseline="0" noProof="0" dirty="0" smtClean="0">
+                <a:ln>
+                  <a:noFill/>
+                </a:ln>
+                <a:solidFill>
+                  <a:prstClr val="black"/>
+                </a:solidFill>
+                <a:effectLst/>
+                <a:uLnTx/>
+                <a:uFillTx/>
+                <a:latin typeface="Book Antiqua"/>
+                <a:ea typeface="+mn-ea"/>
+                <a:cs typeface="Book Antiqua"/>
+              </a:rPr>
+              <a:t>assimilation – the process of a person or group becoming a part of a different society. </a:t>
+            </a:r>
+          </a:p>
+          <a:p>
+            <a:pPr marL="0" marR="0" lvl="0" indent="0" algn="l" defTabSz="464424" rtl="0" eaLnBrk="1" fontAlgn="auto" latinLnBrk="0" hangingPunct="1">
+              <a:lnSpc>
+                <a:spcPct val="100000"/>
+              </a:lnSpc>
+              <a:spcBef>
+                <a:spcPts val="0"/>
+              </a:spcBef>
+              <a:spcAft>
+                <a:spcPts val="0"/>
+              </a:spcAft>
+              <a:buClrTx/>
+              <a:buSzTx/>
+              <a:buFont typeface="Arial" pitchFamily="34" charset="0"/>
+              <a:buNone/>
+              <a:tabLst/>
+              <a:defRPr/>
+            </a:pPr>
+            <a:r>
+              <a:rPr kumimoji="0" lang="en-US" sz="800" b="0" i="0" u="none" strike="noStrike" kern="1200" cap="none" spc="0" normalizeH="0" baseline="0" noProof="0" dirty="0" smtClean="0">
+                <a:ln>
+                  <a:noFill/>
+                </a:ln>
+                <a:solidFill>
+                  <a:prstClr val="black"/>
+                </a:solidFill>
+                <a:effectLst/>
+                <a:uLnTx/>
+                <a:uFillTx/>
+                <a:latin typeface="Book Antiqua"/>
+                <a:ea typeface="+mn-ea"/>
+                <a:cs typeface="Book Antiqua"/>
+              </a:rPr>
+              <a:t>emigrate – leave one nation to move to another.</a:t>
+            </a:r>
+          </a:p>
+          <a:p>
+            <a:pPr marL="0" marR="0" lvl="0" indent="0" algn="l" defTabSz="464424" rtl="0" eaLnBrk="1" fontAlgn="auto" latinLnBrk="0" hangingPunct="1">
+              <a:lnSpc>
+                <a:spcPct val="100000"/>
+              </a:lnSpc>
+              <a:spcBef>
+                <a:spcPts val="0"/>
+              </a:spcBef>
+              <a:spcAft>
+                <a:spcPts val="0"/>
+              </a:spcAft>
+              <a:buClrTx/>
+              <a:buSzTx/>
+              <a:buFont typeface="Arial" pitchFamily="34" charset="0"/>
+              <a:buNone/>
+              <a:tabLst/>
+              <a:defRPr/>
+            </a:pPr>
+            <a:r>
+              <a:rPr kumimoji="0" lang="en-US" sz="800" b="0" i="0" u="none" strike="noStrike" kern="1200" cap="none" spc="0" normalizeH="0" baseline="0" noProof="0" dirty="0" smtClean="0">
+                <a:ln>
+                  <a:noFill/>
+                </a:ln>
+                <a:solidFill>
+                  <a:prstClr val="black"/>
+                </a:solidFill>
+                <a:effectLst/>
+                <a:uLnTx/>
+                <a:uFillTx/>
+                <a:latin typeface="Book Antiqua"/>
+                <a:ea typeface="+mn-ea"/>
+                <a:cs typeface="Book Antiqua"/>
+              </a:rPr>
+              <a:t>mandate – an order putting a nation in charge of managing another nation. </a:t>
+            </a:r>
+            <a:r>
+              <a:rPr kumimoji="0" lang="en-US" sz="800" b="0" i="0" u="none" strike="noStrike" kern="1200" cap="none" spc="0" normalizeH="0" baseline="0" noProof="0" dirty="0" smtClean="0">
+                <a:ln>
+                  <a:noFill/>
+                </a:ln>
+                <a:solidFill>
+                  <a:srgbClr val="4BACC6"/>
+                </a:solidFill>
+                <a:effectLst/>
+                <a:uLnTx/>
+                <a:uFillTx/>
+                <a:latin typeface="+mn-lt"/>
+                <a:ea typeface="+mn-ea"/>
+                <a:cs typeface="+mn-cs"/>
+              </a:rPr>
+              <a:t>partition</a:t>
+            </a:r>
+            <a:r>
+              <a:rPr kumimoji="0" lang="en-US" sz="800" b="1" i="0" u="none" strike="noStrike" kern="1200" cap="none" spc="0" normalizeH="0" baseline="0" noProof="0" dirty="0" smtClean="0">
+                <a:ln>
+                  <a:noFill/>
+                </a:ln>
+                <a:solidFill>
+                  <a:srgbClr val="4BACC6"/>
+                </a:solidFill>
+                <a:effectLst/>
+                <a:uLnTx/>
+                <a:uFillTx/>
+                <a:latin typeface="+mn-lt"/>
+                <a:ea typeface="+mn-ea"/>
+                <a:cs typeface="+mn-cs"/>
+              </a:rPr>
+              <a:t> </a:t>
+            </a:r>
+            <a:r>
+              <a:rPr kumimoji="0" lang="en-US" sz="800" b="0" i="0" u="none" strike="noStrike" kern="1200" cap="none" spc="0" normalizeH="0" baseline="0" noProof="0" dirty="0" smtClean="0">
+                <a:ln>
+                  <a:noFill/>
+                </a:ln>
+                <a:solidFill>
+                  <a:prstClr val="black"/>
+                </a:solidFill>
+                <a:effectLst/>
+                <a:uLnTx/>
+                <a:uFillTx/>
+                <a:latin typeface="Book Antiqua"/>
+                <a:ea typeface="+mn-ea"/>
+                <a:cs typeface="Book Antiqua"/>
+              </a:rPr>
+              <a:t>– the act of dividing something.</a:t>
+            </a:r>
+          </a:p>
+          <a:p>
+            <a:pPr marL="0" marR="0" lvl="0" indent="0" algn="l" defTabSz="464424" rtl="0" eaLnBrk="1" fontAlgn="auto" latinLnBrk="0" hangingPunct="1">
+              <a:lnSpc>
+                <a:spcPct val="100000"/>
+              </a:lnSpc>
+              <a:spcBef>
+                <a:spcPts val="0"/>
+              </a:spcBef>
+              <a:spcAft>
+                <a:spcPts val="0"/>
+              </a:spcAft>
+              <a:buClrTx/>
+              <a:buSzTx/>
+              <a:buFont typeface="Arial" pitchFamily="34" charset="0"/>
+              <a:buNone/>
+              <a:tabLst/>
+              <a:defRPr/>
+            </a:pPr>
             <a:endParaRPr lang="en-US" sz="800" b="0" kern="1200" baseline="0" dirty="0">
               <a:solidFill>
                 <a:schemeClr val="tx1"/>
@@ -27668,7 +28153,7 @@
   </p:txStyles>
   <p:extLst>
     <p:ext uri="{27BBF7A9-308A-43DC-89C8-2F10F3537804}">
-      <p15:sldGuideLst xmlns:p15="http://schemas.microsoft.com/office/powerpoint/2012/main" xmlns="">
+      <p15:sldGuideLst xmlns="" xmlns:p15="http://schemas.microsoft.com/office/powerpoint/2012/main">
         <p15:guide id="1" pos="1638" userDrawn="1">
           <p15:clr>
             <a:srgbClr val="F26B43"/>
@@ -28368,7 +28853,7 @@
   </p:txStyles>
   <p:extLst>
     <p:ext uri="{27BBF7A9-308A-43DC-89C8-2F10F3537804}">
-      <p15:sldGuideLst xmlns:p15="http://schemas.microsoft.com/office/powerpoint/2012/main" xmlns="">
+      <p15:sldGuideLst xmlns="" xmlns:p15="http://schemas.microsoft.com/office/powerpoint/2012/main">
         <p15:guide id="1" pos="1638" userDrawn="1">
           <p15:clr>
             <a:srgbClr val="F26B43"/>
@@ -29123,7 +29608,7 @@
   </p:txStyles>
   <p:extLst>
     <p:ext uri="{27BBF7A9-308A-43DC-89C8-2F10F3537804}">
-      <p15:sldGuideLst xmlns:p15="http://schemas.microsoft.com/office/powerpoint/2012/main" xmlns="">
+      <p15:sldGuideLst xmlns="" xmlns:p15="http://schemas.microsoft.com/office/powerpoint/2012/main">
         <p15:guide id="1" pos="1638" userDrawn="1">
           <p15:clr>
             <a:srgbClr val="F26B43"/>
@@ -30595,7 +31080,7 @@
   </p:txStyles>
   <p:extLst>
     <p:ext uri="{27BBF7A9-308A-43DC-89C8-2F10F3537804}">
-      <p15:sldGuideLst xmlns:p15="http://schemas.microsoft.com/office/powerpoint/2012/main" xmlns="">
+      <p15:sldGuideLst xmlns="" xmlns:p15="http://schemas.microsoft.com/office/powerpoint/2012/main">
         <p15:guide id="1" pos="1638" userDrawn="1">
           <p15:clr>
             <a:srgbClr val="F26B43"/>
@@ -32671,21 +33156,21 @@
                 <a:gridCol w="786177">
                   <a:extLst>
                     <a:ext uri="{9D8B030D-6E8A-4147-A177-3AD203B41FA5}">
-                      <a16:colId xmlns:a16="http://schemas.microsoft.com/office/drawing/2014/main" xmlns="" val="20000"/>
+                      <a16:colId xmlns="" xmlns:a16="http://schemas.microsoft.com/office/drawing/2014/main" val="20000"/>
                     </a:ext>
                   </a:extLst>
                 </a:gridCol>
                 <a:gridCol w="486538">
                   <a:extLst>
                     <a:ext uri="{9D8B030D-6E8A-4147-A177-3AD203B41FA5}">
-                      <a16:colId xmlns:a16="http://schemas.microsoft.com/office/drawing/2014/main" xmlns="" val="20001"/>
+                      <a16:colId xmlns="" xmlns:a16="http://schemas.microsoft.com/office/drawing/2014/main" val="20001"/>
                     </a:ext>
                   </a:extLst>
                 </a:gridCol>
                 <a:gridCol w="1194130">
                   <a:extLst>
                     <a:ext uri="{9D8B030D-6E8A-4147-A177-3AD203B41FA5}">
-                      <a16:colId xmlns:a16="http://schemas.microsoft.com/office/drawing/2014/main" xmlns="" val="20002"/>
+                      <a16:colId xmlns="" xmlns:a16="http://schemas.microsoft.com/office/drawing/2014/main" val="20002"/>
                     </a:ext>
                   </a:extLst>
                 </a:gridCol>
@@ -32882,7 +33367,7 @@
                 </a:tc>
                 <a:extLst>
                   <a:ext uri="{0D108BD9-81ED-4DB2-BD59-A6C34878D82A}">
-                    <a16:rowId xmlns:a16="http://schemas.microsoft.com/office/drawing/2014/main" xmlns="" val="10000"/>
+                    <a16:rowId xmlns="" xmlns:a16="http://schemas.microsoft.com/office/drawing/2014/main" val="10000"/>
                   </a:ext>
                 </a:extLst>
               </a:tr>
@@ -33033,7 +33518,7 @@
                 </a:tc>
                 <a:extLst>
                   <a:ext uri="{0D108BD9-81ED-4DB2-BD59-A6C34878D82A}">
-                    <a16:rowId xmlns:a16="http://schemas.microsoft.com/office/drawing/2014/main" xmlns="" val="10001"/>
+                    <a16:rowId xmlns="" xmlns:a16="http://schemas.microsoft.com/office/drawing/2014/main" val="10001"/>
                   </a:ext>
                 </a:extLst>
               </a:tr>
@@ -33184,7 +33669,7 @@
                 </a:tc>
                 <a:extLst>
                   <a:ext uri="{0D108BD9-81ED-4DB2-BD59-A6C34878D82A}">
-                    <a16:rowId xmlns:a16="http://schemas.microsoft.com/office/drawing/2014/main" xmlns="" val="10002"/>
+                    <a16:rowId xmlns="" xmlns:a16="http://schemas.microsoft.com/office/drawing/2014/main" val="10002"/>
                   </a:ext>
                 </a:extLst>
               </a:tr>
@@ -33335,7 +33820,7 @@
                 </a:tc>
                 <a:extLst>
                   <a:ext uri="{0D108BD9-81ED-4DB2-BD59-A6C34878D82A}">
-                    <a16:rowId xmlns:a16="http://schemas.microsoft.com/office/drawing/2014/main" xmlns="" val="10003"/>
+                    <a16:rowId xmlns="" xmlns:a16="http://schemas.microsoft.com/office/drawing/2014/main" val="10003"/>
                   </a:ext>
                 </a:extLst>
               </a:tr>
@@ -33486,7 +33971,7 @@
                 </a:tc>
                 <a:extLst>
                   <a:ext uri="{0D108BD9-81ED-4DB2-BD59-A6C34878D82A}">
-                    <a16:rowId xmlns:a16="http://schemas.microsoft.com/office/drawing/2014/main" xmlns="" val="10004"/>
+                    <a16:rowId xmlns="" xmlns:a16="http://schemas.microsoft.com/office/drawing/2014/main" val="10004"/>
                   </a:ext>
                 </a:extLst>
               </a:tr>
@@ -33637,7 +34122,7 @@
                 </a:tc>
                 <a:extLst>
                   <a:ext uri="{0D108BD9-81ED-4DB2-BD59-A6C34878D82A}">
-                    <a16:rowId xmlns:a16="http://schemas.microsoft.com/office/drawing/2014/main" xmlns="" val="10005"/>
+                    <a16:rowId xmlns="" xmlns:a16="http://schemas.microsoft.com/office/drawing/2014/main" val="10005"/>
                   </a:ext>
                 </a:extLst>
               </a:tr>
@@ -33788,7 +34273,7 @@
                 </a:tc>
                 <a:extLst>
                   <a:ext uri="{0D108BD9-81ED-4DB2-BD59-A6C34878D82A}">
-                    <a16:rowId xmlns:a16="http://schemas.microsoft.com/office/drawing/2014/main" xmlns="" val="10006"/>
+                    <a16:rowId xmlns="" xmlns:a16="http://schemas.microsoft.com/office/drawing/2014/main" val="10006"/>
                   </a:ext>
                 </a:extLst>
               </a:tr>
@@ -33939,7 +34424,7 @@
                 </a:tc>
                 <a:extLst>
                   <a:ext uri="{0D108BD9-81ED-4DB2-BD59-A6C34878D82A}">
-                    <a16:rowId xmlns:a16="http://schemas.microsoft.com/office/drawing/2014/main" xmlns="" val="10007"/>
+                    <a16:rowId xmlns="" xmlns:a16="http://schemas.microsoft.com/office/drawing/2014/main" val="10007"/>
                   </a:ext>
                 </a:extLst>
               </a:tr>
@@ -34090,7 +34575,7 @@
                 </a:tc>
                 <a:extLst>
                   <a:ext uri="{0D108BD9-81ED-4DB2-BD59-A6C34878D82A}">
-                    <a16:rowId xmlns:a16="http://schemas.microsoft.com/office/drawing/2014/main" xmlns="" val="10008"/>
+                    <a16:rowId xmlns="" xmlns:a16="http://schemas.microsoft.com/office/drawing/2014/main" val="10008"/>
                   </a:ext>
                 </a:extLst>
               </a:tr>
@@ -34241,7 +34726,7 @@
                 </a:tc>
                 <a:extLst>
                   <a:ext uri="{0D108BD9-81ED-4DB2-BD59-A6C34878D82A}">
-                    <a16:rowId xmlns:a16="http://schemas.microsoft.com/office/drawing/2014/main" xmlns="" val="10009"/>
+                    <a16:rowId xmlns="" xmlns:a16="http://schemas.microsoft.com/office/drawing/2014/main" val="10009"/>
                   </a:ext>
                 </a:extLst>
               </a:tr>
@@ -34392,7 +34877,7 @@
                 </a:tc>
                 <a:extLst>
                   <a:ext uri="{0D108BD9-81ED-4DB2-BD59-A6C34878D82A}">
-                    <a16:rowId xmlns:a16="http://schemas.microsoft.com/office/drawing/2014/main" xmlns="" val="10010"/>
+                    <a16:rowId xmlns="" xmlns:a16="http://schemas.microsoft.com/office/drawing/2014/main" val="10010"/>
                   </a:ext>
                 </a:extLst>
               </a:tr>
@@ -34543,7 +35028,7 @@
                 </a:tc>
                 <a:extLst>
                   <a:ext uri="{0D108BD9-81ED-4DB2-BD59-A6C34878D82A}">
-                    <a16:rowId xmlns:a16="http://schemas.microsoft.com/office/drawing/2014/main" xmlns="" val="10011"/>
+                    <a16:rowId xmlns="" xmlns:a16="http://schemas.microsoft.com/office/drawing/2014/main" val="10011"/>
                   </a:ext>
                 </a:extLst>
               </a:tr>
@@ -34694,7 +35179,7 @@
                 </a:tc>
                 <a:extLst>
                   <a:ext uri="{0D108BD9-81ED-4DB2-BD59-A6C34878D82A}">
-                    <a16:rowId xmlns:a16="http://schemas.microsoft.com/office/drawing/2014/main" xmlns="" val="10012"/>
+                    <a16:rowId xmlns="" xmlns:a16="http://schemas.microsoft.com/office/drawing/2014/main" val="10012"/>
                   </a:ext>
                 </a:extLst>
               </a:tr>
@@ -34845,7 +35330,7 @@
                 </a:tc>
                 <a:extLst>
                   <a:ext uri="{0D108BD9-81ED-4DB2-BD59-A6C34878D82A}">
-                    <a16:rowId xmlns:a16="http://schemas.microsoft.com/office/drawing/2014/main" xmlns="" val="10013"/>
+                    <a16:rowId xmlns="" xmlns:a16="http://schemas.microsoft.com/office/drawing/2014/main" val="10013"/>
                   </a:ext>
                 </a:extLst>
               </a:tr>
@@ -34996,7 +35481,7 @@
                 </a:tc>
                 <a:extLst>
                   <a:ext uri="{0D108BD9-81ED-4DB2-BD59-A6C34878D82A}">
-                    <a16:rowId xmlns:a16="http://schemas.microsoft.com/office/drawing/2014/main" xmlns="" val="10014"/>
+                    <a16:rowId xmlns="" xmlns:a16="http://schemas.microsoft.com/office/drawing/2014/main" val="10014"/>
                   </a:ext>
                 </a:extLst>
               </a:tr>
@@ -35147,7 +35632,7 @@
                 </a:tc>
                 <a:extLst>
                   <a:ext uri="{0D108BD9-81ED-4DB2-BD59-A6C34878D82A}">
-                    <a16:rowId xmlns:a16="http://schemas.microsoft.com/office/drawing/2014/main" xmlns="" val="10015"/>
+                    <a16:rowId xmlns="" xmlns:a16="http://schemas.microsoft.com/office/drawing/2014/main" val="10015"/>
                   </a:ext>
                 </a:extLst>
               </a:tr>
@@ -35183,21 +35668,21 @@
                 <a:gridCol w="786177">
                   <a:extLst>
                     <a:ext uri="{9D8B030D-6E8A-4147-A177-3AD203B41FA5}">
-                      <a16:colId xmlns:a16="http://schemas.microsoft.com/office/drawing/2014/main" xmlns="" val="20000"/>
+                      <a16:colId xmlns="" xmlns:a16="http://schemas.microsoft.com/office/drawing/2014/main" val="20000"/>
                     </a:ext>
                   </a:extLst>
                 </a:gridCol>
                 <a:gridCol w="486538">
                   <a:extLst>
                     <a:ext uri="{9D8B030D-6E8A-4147-A177-3AD203B41FA5}">
-                      <a16:colId xmlns:a16="http://schemas.microsoft.com/office/drawing/2014/main" xmlns="" val="20001"/>
+                      <a16:colId xmlns="" xmlns:a16="http://schemas.microsoft.com/office/drawing/2014/main" val="20001"/>
                     </a:ext>
                   </a:extLst>
                 </a:gridCol>
                 <a:gridCol w="1194130">
                   <a:extLst>
                     <a:ext uri="{9D8B030D-6E8A-4147-A177-3AD203B41FA5}">
-                      <a16:colId xmlns:a16="http://schemas.microsoft.com/office/drawing/2014/main" xmlns="" val="20002"/>
+                      <a16:colId xmlns="" xmlns:a16="http://schemas.microsoft.com/office/drawing/2014/main" val="20002"/>
                     </a:ext>
                   </a:extLst>
                 </a:gridCol>
@@ -35394,7 +35879,7 @@
                 </a:tc>
                 <a:extLst>
                   <a:ext uri="{0D108BD9-81ED-4DB2-BD59-A6C34878D82A}">
-                    <a16:rowId xmlns:a16="http://schemas.microsoft.com/office/drawing/2014/main" xmlns="" val="10000"/>
+                    <a16:rowId xmlns="" xmlns:a16="http://schemas.microsoft.com/office/drawing/2014/main" val="10000"/>
                   </a:ext>
                 </a:extLst>
               </a:tr>
@@ -35545,7 +36030,7 @@
                 </a:tc>
                 <a:extLst>
                   <a:ext uri="{0D108BD9-81ED-4DB2-BD59-A6C34878D82A}">
-                    <a16:rowId xmlns:a16="http://schemas.microsoft.com/office/drawing/2014/main" xmlns="" val="10001"/>
+                    <a16:rowId xmlns="" xmlns:a16="http://schemas.microsoft.com/office/drawing/2014/main" val="10001"/>
                   </a:ext>
                 </a:extLst>
               </a:tr>
@@ -35696,7 +36181,7 @@
                 </a:tc>
                 <a:extLst>
                   <a:ext uri="{0D108BD9-81ED-4DB2-BD59-A6C34878D82A}">
-                    <a16:rowId xmlns:a16="http://schemas.microsoft.com/office/drawing/2014/main" xmlns="" val="10002"/>
+                    <a16:rowId xmlns="" xmlns:a16="http://schemas.microsoft.com/office/drawing/2014/main" val="10002"/>
                   </a:ext>
                 </a:extLst>
               </a:tr>
@@ -35847,7 +36332,7 @@
                 </a:tc>
                 <a:extLst>
                   <a:ext uri="{0D108BD9-81ED-4DB2-BD59-A6C34878D82A}">
-                    <a16:rowId xmlns:a16="http://schemas.microsoft.com/office/drawing/2014/main" xmlns="" val="10003"/>
+                    <a16:rowId xmlns="" xmlns:a16="http://schemas.microsoft.com/office/drawing/2014/main" val="10003"/>
                   </a:ext>
                 </a:extLst>
               </a:tr>
@@ -35998,7 +36483,7 @@
                 </a:tc>
                 <a:extLst>
                   <a:ext uri="{0D108BD9-81ED-4DB2-BD59-A6C34878D82A}">
-                    <a16:rowId xmlns:a16="http://schemas.microsoft.com/office/drawing/2014/main" xmlns="" val="10004"/>
+                    <a16:rowId xmlns="" xmlns:a16="http://schemas.microsoft.com/office/drawing/2014/main" val="10004"/>
                   </a:ext>
                 </a:extLst>
               </a:tr>
@@ -36149,7 +36634,7 @@
                 </a:tc>
                 <a:extLst>
                   <a:ext uri="{0D108BD9-81ED-4DB2-BD59-A6C34878D82A}">
-                    <a16:rowId xmlns:a16="http://schemas.microsoft.com/office/drawing/2014/main" xmlns="" val="10005"/>
+                    <a16:rowId xmlns="" xmlns:a16="http://schemas.microsoft.com/office/drawing/2014/main" val="10005"/>
                   </a:ext>
                 </a:extLst>
               </a:tr>
@@ -36300,7 +36785,7 @@
                 </a:tc>
                 <a:extLst>
                   <a:ext uri="{0D108BD9-81ED-4DB2-BD59-A6C34878D82A}">
-                    <a16:rowId xmlns:a16="http://schemas.microsoft.com/office/drawing/2014/main" xmlns="" val="10006"/>
+                    <a16:rowId xmlns="" xmlns:a16="http://schemas.microsoft.com/office/drawing/2014/main" val="10006"/>
                   </a:ext>
                 </a:extLst>
               </a:tr>
@@ -36451,7 +36936,7 @@
                 </a:tc>
                 <a:extLst>
                   <a:ext uri="{0D108BD9-81ED-4DB2-BD59-A6C34878D82A}">
-                    <a16:rowId xmlns:a16="http://schemas.microsoft.com/office/drawing/2014/main" xmlns="" val="10007"/>
+                    <a16:rowId xmlns="" xmlns:a16="http://schemas.microsoft.com/office/drawing/2014/main" val="10007"/>
                   </a:ext>
                 </a:extLst>
               </a:tr>
@@ -36602,7 +37087,7 @@
                 </a:tc>
                 <a:extLst>
                   <a:ext uri="{0D108BD9-81ED-4DB2-BD59-A6C34878D82A}">
-                    <a16:rowId xmlns:a16="http://schemas.microsoft.com/office/drawing/2014/main" xmlns="" val="10008"/>
+                    <a16:rowId xmlns="" xmlns:a16="http://schemas.microsoft.com/office/drawing/2014/main" val="10008"/>
                   </a:ext>
                 </a:extLst>
               </a:tr>
@@ -36753,7 +37238,7 @@
                 </a:tc>
                 <a:extLst>
                   <a:ext uri="{0D108BD9-81ED-4DB2-BD59-A6C34878D82A}">
-                    <a16:rowId xmlns:a16="http://schemas.microsoft.com/office/drawing/2014/main" xmlns="" val="10009"/>
+                    <a16:rowId xmlns="" xmlns:a16="http://schemas.microsoft.com/office/drawing/2014/main" val="10009"/>
                   </a:ext>
                 </a:extLst>
               </a:tr>
@@ -36904,7 +37389,7 @@
                 </a:tc>
                 <a:extLst>
                   <a:ext uri="{0D108BD9-81ED-4DB2-BD59-A6C34878D82A}">
-                    <a16:rowId xmlns:a16="http://schemas.microsoft.com/office/drawing/2014/main" xmlns="" val="10010"/>
+                    <a16:rowId xmlns="" xmlns:a16="http://schemas.microsoft.com/office/drawing/2014/main" val="10010"/>
                   </a:ext>
                 </a:extLst>
               </a:tr>
@@ -37055,7 +37540,7 @@
                 </a:tc>
                 <a:extLst>
                   <a:ext uri="{0D108BD9-81ED-4DB2-BD59-A6C34878D82A}">
-                    <a16:rowId xmlns:a16="http://schemas.microsoft.com/office/drawing/2014/main" xmlns="" val="10011"/>
+                    <a16:rowId xmlns="" xmlns:a16="http://schemas.microsoft.com/office/drawing/2014/main" val="10011"/>
                   </a:ext>
                 </a:extLst>
               </a:tr>
@@ -37206,7 +37691,7 @@
                 </a:tc>
                 <a:extLst>
                   <a:ext uri="{0D108BD9-81ED-4DB2-BD59-A6C34878D82A}">
-                    <a16:rowId xmlns:a16="http://schemas.microsoft.com/office/drawing/2014/main" xmlns="" val="10012"/>
+                    <a16:rowId xmlns="" xmlns:a16="http://schemas.microsoft.com/office/drawing/2014/main" val="10012"/>
                   </a:ext>
                 </a:extLst>
               </a:tr>
@@ -37357,7 +37842,7 @@
                 </a:tc>
                 <a:extLst>
                   <a:ext uri="{0D108BD9-81ED-4DB2-BD59-A6C34878D82A}">
-                    <a16:rowId xmlns:a16="http://schemas.microsoft.com/office/drawing/2014/main" xmlns="" val="10013"/>
+                    <a16:rowId xmlns="" xmlns:a16="http://schemas.microsoft.com/office/drawing/2014/main" val="10013"/>
                   </a:ext>
                 </a:extLst>
               </a:tr>
@@ -37508,7 +37993,7 @@
                 </a:tc>
                 <a:extLst>
                   <a:ext uri="{0D108BD9-81ED-4DB2-BD59-A6C34878D82A}">
-                    <a16:rowId xmlns:a16="http://schemas.microsoft.com/office/drawing/2014/main" xmlns="" val="10014"/>
+                    <a16:rowId xmlns="" xmlns:a16="http://schemas.microsoft.com/office/drawing/2014/main" val="10014"/>
                   </a:ext>
                 </a:extLst>
               </a:tr>
@@ -37924,13 +38409,70 @@
               <a:buNone/>
             </a:pPr>
             <a:r>
-              <a:rPr lang="en-US" b="1" dirty="0">
+              <a:rPr lang="en-US" b="1" dirty="0" smtClean="0">
                 <a:solidFill>
                   <a:schemeClr val="accent5"/>
                 </a:solidFill>
               </a:rPr>
               <a:t>Zionism</a:t>
             </a:r>
+          </a:p>
+          <a:p>
+            <a:pPr marL="0" indent="0">
+              <a:buNone/>
+            </a:pPr>
+            <a:r>
+              <a:rPr lang="en-US" b="1" dirty="0">
+                <a:solidFill>
+                  <a:schemeClr val="accent5"/>
+                </a:solidFill>
+              </a:rPr>
+              <a:t>assimilation </a:t>
+            </a:r>
+          </a:p>
+          <a:p>
+            <a:pPr marL="0" indent="0">
+              <a:buNone/>
+            </a:pPr>
+            <a:r>
+              <a:rPr lang="en-US" b="1" dirty="0">
+                <a:solidFill>
+                  <a:schemeClr val="accent5"/>
+                </a:solidFill>
+              </a:rPr>
+              <a:t>emigrate</a:t>
+            </a:r>
+          </a:p>
+          <a:p>
+            <a:pPr marL="0" indent="0">
+              <a:buNone/>
+            </a:pPr>
+            <a:r>
+              <a:rPr lang="en-US" b="1" dirty="0">
+                <a:solidFill>
+                  <a:schemeClr val="accent5"/>
+                </a:solidFill>
+              </a:rPr>
+              <a:t>mandate</a:t>
+            </a:r>
+          </a:p>
+          <a:p>
+            <a:pPr marL="0" indent="0">
+              <a:buNone/>
+            </a:pPr>
+            <a:r>
+              <a:rPr lang="en-US" b="1" dirty="0">
+                <a:solidFill>
+                  <a:schemeClr val="accent5"/>
+                </a:solidFill>
+              </a:rPr>
+              <a:t>partition</a:t>
+            </a:r>
+            <a:endParaRPr lang="en-US" b="1" dirty="0">
+              <a:solidFill>
+                <a:schemeClr val="accent5"/>
+              </a:solidFill>
+            </a:endParaRPr>
           </a:p>
         </p:txBody>
       </p:sp>
@@ -42731,6 +43273,40 @@
 </file>
 
 <file path=customXml/item1.xml><?xml version="1.0" encoding="utf-8"?>
+<p:properties xmlns:p="http://schemas.microsoft.com/office/2006/metadata/properties" xmlns:xsi="http://www.w3.org/2001/XMLSchema-instance" xmlns:pc="http://schemas.microsoft.com/office/infopath/2007/PartnerControls">
+  <documentManagement>
+    <_dlc_DocId xmlns="8e8c147c-4a44-4efb-abf1-e3af25080dca">NYTQRMT4MAHZ-1-73408</_dlc_DocId>
+    <_dlc_DocIdUrl xmlns="8e8c147c-4a44-4efb-abf1-e3af25080dca">
+      <Url>http://eportal.education2020.com/Curriculum/CMath/_layouts/DocIdRedir.aspx?ID=NYTQRMT4MAHZ-1-73408</Url>
+      <Description>NYTQRMT4MAHZ-1-73408</Description>
+    </_dlc_DocIdUrl>
+    <Target_x0020_Audiences xmlns="e488ce5d-f489-49a9-8091-c8b3fdc3ce56" xsi:nil="true"/>
+    <Order0 xmlns="e488ce5d-f489-49a9-8091-c8b3fdc3ce56" xsi:nil="true"/>
+    <TaxCatchAll xmlns="8e8c147c-4a44-4efb-abf1-e3af25080dca">
+      <Value>7432</Value>
+    </TaxCatchAll>
+    <TaxKeywordTaxHTField xmlns="8e8c147c-4a44-4efb-abf1-e3af25080dca">
+      <Terms xmlns="http://schemas.microsoft.com/office/infopath/2007/PartnerControls">
+        <TermInfo xmlns="http://schemas.microsoft.com/office/infopath/2007/PartnerControls">
+          <TermName xmlns="http://schemas.microsoft.com/office/infopath/2007/PartnerControls">Lesson Shell</TermName>
+          <TermId xmlns="http://schemas.microsoft.com/office/infopath/2007/PartnerControls">7b823159-1b76-4161-b004-4b1e873e8ffe</TermId>
+        </TermInfo>
+      </Terms>
+    </TaxKeywordTaxHTField>
+  </documentManagement>
+</p:properties>
+</file>
+
+<file path=customXml/item2.xml><?xml version="1.0" encoding="utf-8"?>
+<?mso-contentType ?>
+<FormTemplates xmlns="http://schemas.microsoft.com/sharepoint/v3/contenttype/forms">
+  <Display>DocumentLibraryForm</Display>
+  <Edit>DocumentLibraryForm</Edit>
+  <New>DocumentLibraryForm</New>
+</FormTemplates>
+</file>
+
+<file path=customXml/item3.xml><?xml version="1.0" encoding="utf-8"?>
 <?mso-contentType ?>
 <spe:Receivers xmlns:spe="http://schemas.microsoft.com/sharepoint/events">
   <Receiver>
@@ -42774,40 +43350,6 @@
     <Filter/>
   </Receiver>
 </spe:Receivers>
-</file>
-
-<file path=customXml/item2.xml><?xml version="1.0" encoding="utf-8"?>
-<?mso-contentType ?>
-<FormTemplates xmlns="http://schemas.microsoft.com/sharepoint/v3/contenttype/forms">
-  <Display>DocumentLibraryForm</Display>
-  <Edit>DocumentLibraryForm</Edit>
-  <New>DocumentLibraryForm</New>
-</FormTemplates>
-</file>
-
-<file path=customXml/item3.xml><?xml version="1.0" encoding="utf-8"?>
-<p:properties xmlns:p="http://schemas.microsoft.com/office/2006/metadata/properties" xmlns:xsi="http://www.w3.org/2001/XMLSchema-instance" xmlns:pc="http://schemas.microsoft.com/office/infopath/2007/PartnerControls">
-  <documentManagement>
-    <_dlc_DocId xmlns="8e8c147c-4a44-4efb-abf1-e3af25080dca">NYTQRMT4MAHZ-1-73408</_dlc_DocId>
-    <_dlc_DocIdUrl xmlns="8e8c147c-4a44-4efb-abf1-e3af25080dca">
-      <Url>http://eportal.education2020.com/Curriculum/CMath/_layouts/DocIdRedir.aspx?ID=NYTQRMT4MAHZ-1-73408</Url>
-      <Description>NYTQRMT4MAHZ-1-73408</Description>
-    </_dlc_DocIdUrl>
-    <Target_x0020_Audiences xmlns="e488ce5d-f489-49a9-8091-c8b3fdc3ce56" xsi:nil="true"/>
-    <Order0 xmlns="e488ce5d-f489-49a9-8091-c8b3fdc3ce56" xsi:nil="true"/>
-    <TaxCatchAll xmlns="8e8c147c-4a44-4efb-abf1-e3af25080dca">
-      <Value>7432</Value>
-    </TaxCatchAll>
-    <TaxKeywordTaxHTField xmlns="8e8c147c-4a44-4efb-abf1-e3af25080dca">
-      <Terms xmlns="http://schemas.microsoft.com/office/infopath/2007/PartnerControls">
-        <TermInfo xmlns="http://schemas.microsoft.com/office/infopath/2007/PartnerControls">
-          <TermName xmlns="http://schemas.microsoft.com/office/infopath/2007/PartnerControls">Lesson Shell</TermName>
-          <TermId xmlns="http://schemas.microsoft.com/office/infopath/2007/PartnerControls">7b823159-1b76-4161-b004-4b1e873e8ffe</TermId>
-        </TermInfo>
-      </Terms>
-    </TaxKeywordTaxHTField>
-  </documentManagement>
-</p:properties>
 </file>
 
 <file path=customXml/item4.xml><?xml version="1.0" encoding="utf-8"?>
@@ -42995,10 +43537,18 @@
 </file>
 
 <file path=customXml/itemProps1.xml><?xml version="1.0" encoding="utf-8"?>
-<ds:datastoreItem xmlns:ds="http://schemas.openxmlformats.org/officeDocument/2006/customXml" ds:itemID="{1EECF812-387C-4DE4-B9A3-9F7A72D3EC4A}">
+<ds:datastoreItem xmlns:ds="http://schemas.openxmlformats.org/officeDocument/2006/customXml" ds:itemID="{05D38530-3CCC-436F-BB00-72BDEC3E8657}">
   <ds:schemaRefs>
-    <ds:schemaRef ds:uri="http://schemas.microsoft.com/sharepoint/events"/>
-    <ds:schemaRef ds:uri="http://www.w3.org/2000/xmlns/"/>
+    <ds:schemaRef ds:uri="http://schemas.microsoft.com/office/2006/documentManagement/types"/>
+    <ds:schemaRef ds:uri="8e8c147c-4a44-4efb-abf1-e3af25080dca"/>
+    <ds:schemaRef ds:uri="e488ce5d-f489-49a9-8091-c8b3fdc3ce56"/>
+    <ds:schemaRef ds:uri="http://schemas.openxmlformats.org/package/2006/metadata/core-properties"/>
+    <ds:schemaRef ds:uri="http://purl.org/dc/dcmitype/"/>
+    <ds:schemaRef ds:uri="http://www.w3.org/XML/1998/namespace"/>
+    <ds:schemaRef ds:uri="http://purl.org/dc/terms/"/>
+    <ds:schemaRef ds:uri="http://schemas.microsoft.com/office/2006/metadata/properties"/>
+    <ds:schemaRef ds:uri="http://schemas.microsoft.com/office/infopath/2007/PartnerControls"/>
+    <ds:schemaRef ds:uri="http://purl.org/dc/elements/1.1/"/>
   </ds:schemaRefs>
 </ds:datastoreItem>
 </file>
@@ -43012,18 +43562,10 @@
 </file>
 
 <file path=customXml/itemProps3.xml><?xml version="1.0" encoding="utf-8"?>
-<ds:datastoreItem xmlns:ds="http://schemas.openxmlformats.org/officeDocument/2006/customXml" ds:itemID="{05D38530-3CCC-436F-BB00-72BDEC3E8657}">
+<ds:datastoreItem xmlns:ds="http://schemas.openxmlformats.org/officeDocument/2006/customXml" ds:itemID="{1EECF812-387C-4DE4-B9A3-9F7A72D3EC4A}">
   <ds:schemaRefs>
-    <ds:schemaRef ds:uri="http://schemas.microsoft.com/office/2006/documentManagement/types"/>
-    <ds:schemaRef ds:uri="8e8c147c-4a44-4efb-abf1-e3af25080dca"/>
-    <ds:schemaRef ds:uri="e488ce5d-f489-49a9-8091-c8b3fdc3ce56"/>
-    <ds:schemaRef ds:uri="http://schemas.openxmlformats.org/package/2006/metadata/core-properties"/>
-    <ds:schemaRef ds:uri="http://purl.org/dc/dcmitype/"/>
-    <ds:schemaRef ds:uri="http://www.w3.org/XML/1998/namespace"/>
-    <ds:schemaRef ds:uri="http://purl.org/dc/terms/"/>
-    <ds:schemaRef ds:uri="http://schemas.microsoft.com/office/2006/metadata/properties"/>
-    <ds:schemaRef ds:uri="http://schemas.microsoft.com/office/infopath/2007/PartnerControls"/>
-    <ds:schemaRef ds:uri="http://purl.org/dc/elements/1.1/"/>
+    <ds:schemaRef ds:uri="http://schemas.microsoft.com/sharepoint/events"/>
+    <ds:schemaRef ds:uri="http://www.w3.org/2000/xmlns/"/>
   </ds:schemaRefs>
 </ds:datastoreItem>
 </file>

</xml_diff>

<commit_message>
Update test PPT files
</commit_message>
<xml_diff>
--- a/testing_debug/test_files_symbol_equation_bug/4_0123-45-67_replace_slide_just_add_symbol_ascii_utf8.pptx
+++ b/testing_debug/test_files_symbol_equation_bug/4_0123-45-67_replace_slide_just_add_symbol_ascii_utf8.pptx
@@ -150,7 +150,7 @@
       </p14:sectionLst>
     </p:ext>
     <p:ext uri="{EFAFB233-063F-42B5-8137-9DF3F51BA10A}">
-      <p15:sldGuideLst xmlns="" xmlns:p15="http://schemas.microsoft.com/office/powerpoint/2012/main">
+      <p15:sldGuideLst xmlns:p15="http://schemas.microsoft.com/office/powerpoint/2012/main" xmlns="">
         <p15:guide id="1" orient="horz" pos="921">
           <p15:clr>
             <a:srgbClr val="A4A3A4"/>
@@ -164,7 +164,7 @@
       </p15:sldGuideLst>
     </p:ext>
     <p:ext uri="{2D200454-40CA-4A62-9FC3-DE9A4176ACB9}">
-      <p15:notesGuideLst xmlns="" xmlns:p15="http://schemas.microsoft.com/office/powerpoint/2012/main">
+      <p15:notesGuideLst xmlns:p15="http://schemas.microsoft.com/office/powerpoint/2012/main" xmlns="">
         <p15:guide id="1" orient="horz" pos="2880">
           <p15:clr>
             <a:srgbClr val="A4A3A4"/>
@@ -2482,24 +2482,7 @@
                 <a:ea typeface="+mn-ea"/>
                 <a:cs typeface="Book Antiqua"/>
               </a:rPr>
-              <a:t>emigrate – leave one nation to move to </a:t>
-            </a:r>
-            <a:r>
-              <a:rPr kumimoji="0" lang="en-US" sz="800" b="0" i="0" u="none" strike="noStrike" kern="1200" cap="none" spc="0" normalizeH="0" baseline="0" noProof="0" dirty="0" smtClean="0">
-                <a:ln>
-                  <a:noFill/>
-                </a:ln>
-                <a:solidFill>
-                  <a:prstClr val="black"/>
-                </a:solidFill>
-                <a:effectLst/>
-                <a:uLnTx/>
-                <a:uFillTx/>
-                <a:latin typeface="Book Antiqua"/>
-                <a:ea typeface="+mn-ea"/>
-                <a:cs typeface="Book Antiqua"/>
-              </a:rPr>
-              <a:t>another.</a:t>
+              <a:t>emigrate – leave one nation to move to another.</a:t>
             </a:r>
             <a:r>
               <a:rPr kumimoji="0" lang="en-US" sz="800" b="0" i="0" u="none" strike="noStrike" kern="1200" cap="none" spc="0" normalizeH="0" baseline="0" noProof="0" dirty="0" smtClean="0">
@@ -2637,41 +2620,7 @@
                 <a:ea typeface="+mn-ea"/>
                 <a:cs typeface="Book Antiqua"/>
               </a:rPr>
-              <a:t>mandate </a:t>
-            </a:r>
-            <a:r>
-              <a:rPr kumimoji="0" lang="en-US" sz="800" b="0" i="0" u="none" strike="noStrike" kern="1200" cap="none" spc="0" normalizeH="0" baseline="0" noProof="0" dirty="0" smtClean="0">
-                <a:ln>
-                  <a:noFill/>
-                </a:ln>
-                <a:solidFill>
-                  <a:prstClr val="black"/>
-                </a:solidFill>
-                <a:effectLst/>
-                <a:uLnTx/>
-                <a:uFillTx/>
-                <a:latin typeface="Book Antiqua"/>
-                <a:ea typeface="+mn-ea"/>
-                <a:cs typeface="Book Antiqua"/>
-              </a:rPr>
-              <a:t>– an order putting a nation in charge of managing another nation. </a:t>
-            </a:r>
-            <a:r>
-              <a:rPr kumimoji="0" lang="en-US" sz="800" b="0" i="0" u="none" strike="noStrike" kern="1200" cap="none" spc="0" normalizeH="0" baseline="0" noProof="0" dirty="0" smtClean="0">
-                <a:ln>
-                  <a:noFill/>
-                </a:ln>
-                <a:solidFill>
-                  <a:prstClr val="black"/>
-                </a:solidFill>
-                <a:effectLst/>
-                <a:uLnTx/>
-                <a:uFillTx/>
-                <a:latin typeface="Book Antiqua"/>
-                <a:ea typeface="+mn-ea"/>
-                <a:cs typeface="Book Antiqua"/>
-              </a:rPr>
-              <a:t>˜˚˘˛(Spacing Modifier Letters) </a:t>
+              <a:t>mandate – an order putting a nation in charge of managing another nation. ˜˚˘˛(Spacing Modifier Letters) </a:t>
             </a:r>
             <a:r>
               <a:rPr kumimoji="0" lang="en-US" sz="800" b="0" i="0" u="none" strike="noStrike" kern="1200" cap="none" spc="0" normalizeH="0" baseline="0" noProof="0" dirty="0" err="1" smtClean="0">
@@ -2775,24 +2724,7 @@
                 <a:ea typeface="+mn-ea"/>
                 <a:cs typeface="Book Antiqua"/>
               </a:rPr>
-              <a:t>– the act of dividing </a:t>
-            </a:r>
-            <a:r>
-              <a:rPr kumimoji="0" lang="en-US" sz="800" b="0" i="0" u="none" strike="noStrike" kern="1200" cap="none" spc="0" normalizeH="0" baseline="0" noProof="0" dirty="0" smtClean="0">
-                <a:ln>
-                  <a:noFill/>
-                </a:ln>
-                <a:solidFill>
-                  <a:prstClr val="black"/>
-                </a:solidFill>
-                <a:effectLst/>
-                <a:uLnTx/>
-                <a:uFillTx/>
-                <a:latin typeface="Book Antiqua"/>
-                <a:ea typeface="+mn-ea"/>
-                <a:cs typeface="Book Antiqua"/>
-              </a:rPr>
-              <a:t>something. </a:t>
+              <a:t>– the act of dividing something. </a:t>
             </a:r>
             <a:r>
               <a:rPr kumimoji="0" lang="en-US" sz="800" b="0" i="0" u="none" strike="noStrike" kern="1200" cap="none" spc="0" normalizeH="0" baseline="0" noProof="0" dirty="0" smtClean="0">
@@ -2859,41 +2791,7 @@
                 <a:ea typeface="+mn-ea"/>
                 <a:cs typeface="Book Antiqua"/>
               </a:rPr>
-              <a:t>Zionism </a:t>
-            </a:r>
-            <a:r>
-              <a:rPr kumimoji="0" lang="en-US" sz="800" b="0" i="0" u="none" strike="noStrike" kern="1200" cap="none" spc="0" normalizeH="0" baseline="0" noProof="0" dirty="0" smtClean="0">
-                <a:ln>
-                  <a:noFill/>
-                </a:ln>
-                <a:solidFill>
-                  <a:prstClr val="black"/>
-                </a:solidFill>
-                <a:effectLst/>
-                <a:uLnTx/>
-                <a:uFillTx/>
-                <a:latin typeface="Book Antiqua"/>
-                <a:ea typeface="+mn-ea"/>
-                <a:cs typeface="Book Antiqua"/>
-              </a:rPr>
-              <a:t>– a political movement dedicated to the establishment and maintenance of a Jewish state in </a:t>
-            </a:r>
-            <a:r>
-              <a:rPr kumimoji="0" lang="en-US" sz="800" b="0" i="0" u="none" strike="noStrike" kern="1200" cap="none" spc="0" normalizeH="0" baseline="0" noProof="0" dirty="0" smtClean="0">
-                <a:ln>
-                  <a:noFill/>
-                </a:ln>
-                <a:solidFill>
-                  <a:prstClr val="black"/>
-                </a:solidFill>
-                <a:effectLst/>
-                <a:uLnTx/>
-                <a:uFillTx/>
-                <a:latin typeface="Book Antiqua"/>
-                <a:ea typeface="+mn-ea"/>
-                <a:cs typeface="Book Antiqua"/>
-              </a:rPr>
-              <a:t>Palestine.</a:t>
+              <a:t>Zionism – a political movement dedicated to the establishment and maintenance of a Jewish state in Palestine.</a:t>
             </a:r>
             <a:r>
               <a:rPr kumimoji="0" lang="en-US" sz="800" b="0" i="0" u="none" strike="noStrike" kern="1200" cap="none" spc="0" normalizeH="0" baseline="0" noProof="0" dirty="0" smtClean="0">
@@ -3017,7 +2915,7 @@
               <a:defRPr/>
             </a:pPr>
             <a:r>
-              <a:rPr kumimoji="0" lang="en-US" sz="800" b="0" i="0" u="none" strike="noStrike" kern="1200" cap="none" spc="0" normalizeH="0" baseline="0" noProof="0" dirty="0" smtClean="0">
+              <a:rPr kumimoji="0" lang="en-US" sz="800" b="0" i="0" u="none" strike="noStrike" kern="1200" cap="none" spc="0" normalizeH="0" baseline="0" noProof="0" dirty="0" err="1" smtClean="0">
                 <a:ln>
                   <a:noFill/>
                 </a:ln>
@@ -3031,7 +2929,126 @@
                 <a:ea typeface="+mn-ea"/>
                 <a:cs typeface="Book Antiqua"/>
               </a:rPr>
-              <a:t>assimilation – the process of a person or group becoming a part of a different society. </a:t>
+              <a:t>imilation</a:t>
+            </a:r>
+            <a:r>
+              <a:rPr kumimoji="0" lang="en-US" sz="800" b="0" i="0" u="none" strike="noStrike" kern="1200" cap="none" spc="0" normalizeH="0" baseline="0" noProof="0" dirty="0" smtClean="0">
+                <a:ln>
+                  <a:noFill/>
+                </a:ln>
+                <a:solidFill>
+                  <a:prstClr val="black"/>
+                </a:solidFill>
+                <a:effectLst/>
+                <a:uLnTx/>
+                <a:uFillTx/>
+                <a:latin typeface="Book Antiqua"/>
+                <a:ea typeface="+mn-ea"/>
+                <a:cs typeface="Book Antiqua"/>
+              </a:rPr>
+              <a:t> – </a:t>
+            </a:r>
+            <a:r>
+              <a:rPr kumimoji="0" lang="en-US" sz="800" b="0" i="0" u="none" strike="noStrike" kern="1200" cap="none" spc="0" normalizeH="0" baseline="0" noProof="0" dirty="0" err="1" smtClean="0">
+                <a:ln>
+                  <a:noFill/>
+                </a:ln>
+                <a:solidFill>
+                  <a:prstClr val="black"/>
+                </a:solidFill>
+                <a:effectLst/>
+                <a:uLnTx/>
+                <a:uFillTx/>
+                <a:latin typeface="Book Antiqua"/>
+                <a:ea typeface="+mn-ea"/>
+                <a:cs typeface="Book Antiqua"/>
+              </a:rPr>
+              <a:t>xxxxx</a:t>
+            </a:r>
+            <a:r>
+              <a:rPr kumimoji="0" lang="en-US" sz="800" b="0" i="0" u="none" strike="noStrike" kern="1200" cap="none" spc="0" normalizeH="0" baseline="0" noProof="0" dirty="0" smtClean="0">
+                <a:ln>
+                  <a:noFill/>
+                </a:ln>
+                <a:solidFill>
+                  <a:prstClr val="black"/>
+                </a:solidFill>
+                <a:effectLst/>
+                <a:uLnTx/>
+                <a:uFillTx/>
+                <a:latin typeface="Book Antiqua"/>
+                <a:ea typeface="+mn-ea"/>
+                <a:cs typeface="Book Antiqua"/>
+              </a:rPr>
+              <a:t> </a:t>
+            </a:r>
+            <a:r>
+              <a:rPr kumimoji="0" lang="en-US" sz="800" b="0" i="0" u="none" strike="noStrike" kern="1200" cap="none" spc="0" normalizeH="0" baseline="0" noProof="0" dirty="0" err="1" smtClean="0">
+                <a:ln>
+                  <a:noFill/>
+                </a:ln>
+                <a:solidFill>
+                  <a:prstClr val="black"/>
+                </a:solidFill>
+                <a:effectLst/>
+                <a:uLnTx/>
+                <a:uFillTx/>
+                <a:latin typeface="Book Antiqua"/>
+                <a:ea typeface="+mn-ea"/>
+                <a:cs typeface="Book Antiqua"/>
+              </a:rPr>
+              <a:t>uuuuu</a:t>
+            </a:r>
+            <a:r>
+              <a:rPr kumimoji="0" lang="en-US" sz="800" b="0" i="0" u="none" strike="noStrike" kern="1200" cap="none" spc="0" normalizeH="0" baseline="0" noProof="0" dirty="0" smtClean="0">
+                <a:ln>
+                  <a:noFill/>
+                </a:ln>
+                <a:solidFill>
+                  <a:prstClr val="black"/>
+                </a:solidFill>
+                <a:effectLst/>
+                <a:uLnTx/>
+                <a:uFillTx/>
+                <a:latin typeface="Book Antiqua"/>
+                <a:ea typeface="+mn-ea"/>
+                <a:cs typeface="Book Antiqua"/>
+              </a:rPr>
+              <a:t> </a:t>
+            </a:r>
+            <a:r>
+              <a:rPr kumimoji="0" lang="en-US" sz="800" b="0" i="0" u="none" strike="noStrike" kern="1200" cap="none" spc="0" normalizeH="0" baseline="0" noProof="0" dirty="0" err="1" smtClean="0">
+                <a:ln>
+                  <a:noFill/>
+                </a:ln>
+                <a:solidFill>
+                  <a:prstClr val="black"/>
+                </a:solidFill>
+                <a:effectLst/>
+                <a:uLnTx/>
+                <a:uFillTx/>
+                <a:latin typeface="Book Antiqua"/>
+                <a:ea typeface="+mn-ea"/>
+                <a:cs typeface="Book Antiqua"/>
+              </a:rPr>
+              <a:t>wwwww</a:t>
+            </a:r>
+            <a:r>
+              <a:rPr kumimoji="0" lang="en-US" sz="800" b="0" i="0" u="none" strike="noStrike" kern="1200" cap="none" spc="0" normalizeH="0" baseline="0" noProof="0" dirty="0" smtClean="0">
+                <a:ln>
+                  <a:noFill/>
+                </a:ln>
+                <a:solidFill>
+                  <a:prstClr val="black"/>
+                </a:solidFill>
+                <a:effectLst/>
+                <a:uLnTx/>
+                <a:uFillTx/>
+                <a:latin typeface="Book Antiqua"/>
+                <a:ea typeface="+mn-ea"/>
+                <a:cs typeface="Book Antiqua"/>
+              </a:rPr>
+              <a:t> zzzz.</a:t>
             </a:r>
           </a:p>
           <a:p>
@@ -3067,7 +3084,143 @@
                 <a:ea typeface="+mn-ea"/>
                 <a:cs typeface="Book Antiqua"/>
               </a:rPr>
-              <a:t>emigrate – leave one nation to move to another.</a:t>
+              <a:t>grate – </a:t>
+            </a:r>
+            <a:r>
+              <a:rPr kumimoji="0" lang="en-US" sz="800" b="0" i="0" u="none" strike="noStrike" kern="1200" cap="none" spc="0" normalizeH="0" baseline="0" noProof="0" dirty="0" err="1" smtClean="0">
+                <a:ln>
+                  <a:noFill/>
+                </a:ln>
+                <a:solidFill>
+                  <a:prstClr val="black"/>
+                </a:solidFill>
+                <a:effectLst/>
+                <a:uLnTx/>
+                <a:uFillTx/>
+                <a:latin typeface="Book Antiqua"/>
+                <a:ea typeface="+mn-ea"/>
+                <a:cs typeface="Book Antiqua"/>
+              </a:rPr>
+              <a:t>aaaaaa</a:t>
+            </a:r>
+            <a:r>
+              <a:rPr kumimoji="0" lang="en-US" sz="800" b="0" i="0" u="none" strike="noStrike" kern="1200" cap="none" spc="0" normalizeH="0" baseline="0" noProof="0" dirty="0" smtClean="0">
+                <a:ln>
+                  <a:noFill/>
+                </a:ln>
+                <a:solidFill>
+                  <a:prstClr val="black"/>
+                </a:solidFill>
+                <a:effectLst/>
+                <a:uLnTx/>
+                <a:uFillTx/>
+                <a:latin typeface="Book Antiqua"/>
+                <a:ea typeface="+mn-ea"/>
+                <a:cs typeface="Book Antiqua"/>
+              </a:rPr>
+              <a:t> </a:t>
+            </a:r>
+            <a:r>
+              <a:rPr kumimoji="0" lang="en-US" sz="800" b="0" i="0" u="none" strike="noStrike" kern="1200" cap="none" spc="0" normalizeH="0" baseline="0" noProof="0" dirty="0" err="1" smtClean="0">
+                <a:ln>
+                  <a:noFill/>
+                </a:ln>
+                <a:solidFill>
+                  <a:prstClr val="black"/>
+                </a:solidFill>
+                <a:effectLst/>
+                <a:uLnTx/>
+                <a:uFillTx/>
+                <a:latin typeface="Book Antiqua"/>
+                <a:ea typeface="+mn-ea"/>
+                <a:cs typeface="Book Antiqua"/>
+              </a:rPr>
+              <a:t>bbbbbb</a:t>
+            </a:r>
+            <a:r>
+              <a:rPr kumimoji="0" lang="en-US" sz="800" b="0" i="0" u="none" strike="noStrike" kern="1200" cap="none" spc="0" normalizeH="0" baseline="0" noProof="0" dirty="0" smtClean="0">
+                <a:ln>
+                  <a:noFill/>
+                </a:ln>
+                <a:solidFill>
+                  <a:prstClr val="black"/>
+                </a:solidFill>
+                <a:effectLst/>
+                <a:uLnTx/>
+                <a:uFillTx/>
+                <a:latin typeface="Book Antiqua"/>
+                <a:ea typeface="+mn-ea"/>
+                <a:cs typeface="Book Antiqua"/>
+              </a:rPr>
+              <a:t> </a:t>
+            </a:r>
+            <a:r>
+              <a:rPr kumimoji="0" lang="en-US" sz="800" b="0" i="0" u="none" strike="noStrike" kern="1200" cap="none" spc="0" normalizeH="0" baseline="0" noProof="0" dirty="0" err="1" smtClean="0">
+                <a:ln>
+                  <a:noFill/>
+                </a:ln>
+                <a:solidFill>
+                  <a:prstClr val="black"/>
+                </a:solidFill>
+                <a:effectLst/>
+                <a:uLnTx/>
+                <a:uFillTx/>
+                <a:latin typeface="Book Antiqua"/>
+                <a:ea typeface="+mn-ea"/>
+                <a:cs typeface="Book Antiqua"/>
+              </a:rPr>
+              <a:t>cccccc</a:t>
+            </a:r>
+            <a:r>
+              <a:rPr kumimoji="0" lang="en-US" sz="800" b="0" i="0" u="none" strike="noStrike" kern="1200" cap="none" spc="0" normalizeH="0" baseline="0" noProof="0" dirty="0" smtClean="0">
+                <a:ln>
+                  <a:noFill/>
+                </a:ln>
+                <a:solidFill>
+                  <a:prstClr val="black"/>
+                </a:solidFill>
+                <a:effectLst/>
+                <a:uLnTx/>
+                <a:uFillTx/>
+                <a:latin typeface="Book Antiqua"/>
+                <a:ea typeface="+mn-ea"/>
+                <a:cs typeface="Book Antiqua"/>
+              </a:rPr>
+              <a:t> </a:t>
+            </a:r>
+            <a:r>
+              <a:rPr kumimoji="0" lang="en-US" sz="800" b="0" i="0" u="none" strike="noStrike" kern="1200" cap="none" spc="0" normalizeH="0" baseline="0" noProof="0" dirty="0" err="1" smtClean="0">
+                <a:ln>
+                  <a:noFill/>
+                </a:ln>
+                <a:solidFill>
+                  <a:prstClr val="black"/>
+                </a:solidFill>
+                <a:effectLst/>
+                <a:uLnTx/>
+                <a:uFillTx/>
+                <a:latin typeface="Book Antiqua"/>
+                <a:ea typeface="+mn-ea"/>
+                <a:cs typeface="Book Antiqua"/>
+              </a:rPr>
+              <a:t>dddddd</a:t>
+            </a:r>
+            <a:r>
+              <a:rPr kumimoji="0" lang="en-US" sz="800" b="0" i="0" u="none" strike="noStrike" kern="1200" cap="none" spc="0" normalizeH="0" baseline="0" noProof="0" dirty="0" smtClean="0">
+                <a:ln>
+                  <a:noFill/>
+                </a:ln>
+                <a:solidFill>
+                  <a:prstClr val="black"/>
+                </a:solidFill>
+                <a:effectLst/>
+                <a:uLnTx/>
+                <a:uFillTx/>
+                <a:latin typeface="Book Antiqua"/>
+                <a:ea typeface="+mn-ea"/>
+                <a:cs typeface="Book Antiqua"/>
+              </a:rPr>
+              <a:t>.</a:t>
             </a:r>
           </a:p>
           <a:p>
@@ -3089,7 +3242,7 @@
               <a:defRPr/>
             </a:pPr>
             <a:r>
-              <a:rPr kumimoji="0" lang="en-US" sz="800" b="0" i="0" u="none" strike="noStrike" kern="1200" cap="none" spc="0" normalizeH="0" baseline="0" noProof="0" dirty="0" smtClean="0">
+              <a:rPr kumimoji="0" lang="en-US" sz="800" b="0" i="0" u="none" strike="noStrike" kern="1200" cap="none" spc="0" normalizeH="0" baseline="0" noProof="0" smtClean="0">
                 <a:ln>
                   <a:noFill/>
                 </a:ln>
@@ -3103,41 +3256,7 @@
                 <a:ea typeface="+mn-ea"/>
                 <a:cs typeface="Book Antiqua"/>
               </a:rPr>
-              <a:t>mandate – an order putting a nation in charge of managing another nation. </a:t>
-            </a:r>
-            <a:r>
-              <a:rPr kumimoji="0" lang="en-US" sz="800" b="0" i="0" u="none" strike="noStrike" kern="1200" cap="none" spc="0" normalizeH="0" baseline="0" noProof="0" dirty="0" smtClean="0">
-                <a:ln>
-                  <a:noFill/>
-                </a:ln>
-                <a:solidFill>
-                  <a:srgbClr val="4BACC6"/>
-                </a:solidFill>
-                <a:effectLst/>
-                <a:uLnTx/>
-                <a:uFillTx/>
-                <a:latin typeface="+mn-lt"/>
-                <a:ea typeface="+mn-ea"/>
-                <a:cs typeface="+mn-cs"/>
-              </a:rPr>
-              <a:t>partition</a:t>
-            </a:r>
-            <a:r>
-              <a:rPr kumimoji="0" lang="en-US" sz="800" b="1" i="0" u="none" strike="noStrike" kern="1200" cap="none" spc="0" normalizeH="0" baseline="0" noProof="0" dirty="0" smtClean="0">
-                <a:ln>
-                  <a:noFill/>
-                </a:ln>
-                <a:solidFill>
-                  <a:srgbClr val="4BACC6"/>
-                </a:solidFill>
-                <a:effectLst/>
-                <a:uLnTx/>
-                <a:uFillTx/>
-                <a:latin typeface="+mn-lt"/>
-                <a:ea typeface="+mn-ea"/>
-                <a:cs typeface="+mn-cs"/>
-              </a:rPr>
-              <a:t> </a:t>
+              <a:t>date </a:t>
             </a:r>
             <a:r>
               <a:rPr kumimoji="0" lang="en-US" sz="800" b="0" i="0" u="none" strike="noStrike" kern="1200" cap="none" spc="0" normalizeH="0" baseline="0" noProof="0" dirty="0" smtClean="0">
@@ -3154,7 +3273,143 @@
                 <a:ea typeface="+mn-ea"/>
                 <a:cs typeface="Book Antiqua"/>
               </a:rPr>
-              <a:t>– the act of dividing something.</a:t>
+              <a:t>– </a:t>
+            </a:r>
+            <a:r>
+              <a:rPr kumimoji="0" lang="en-US" sz="800" b="0" i="0" u="none" strike="noStrike" kern="1200" cap="none" spc="0" normalizeH="0" baseline="0" noProof="0" dirty="0" err="1" smtClean="0">
+                <a:ln>
+                  <a:noFill/>
+                </a:ln>
+                <a:solidFill>
+                  <a:prstClr val="black"/>
+                </a:solidFill>
+                <a:effectLst/>
+                <a:uLnTx/>
+                <a:uFillTx/>
+                <a:latin typeface="Book Antiqua"/>
+                <a:ea typeface="+mn-ea"/>
+                <a:cs typeface="Book Antiqua"/>
+              </a:rPr>
+              <a:t>fffff</a:t>
+            </a:r>
+            <a:r>
+              <a:rPr kumimoji="0" lang="en-US" sz="800" b="0" i="0" u="none" strike="noStrike" kern="1200" cap="none" spc="0" normalizeH="0" baseline="0" noProof="0" dirty="0" smtClean="0">
+                <a:ln>
+                  <a:noFill/>
+                </a:ln>
+                <a:solidFill>
+                  <a:prstClr val="black"/>
+                </a:solidFill>
+                <a:effectLst/>
+                <a:uLnTx/>
+                <a:uFillTx/>
+                <a:latin typeface="Book Antiqua"/>
+                <a:ea typeface="+mn-ea"/>
+                <a:cs typeface="Book Antiqua"/>
+              </a:rPr>
+              <a:t> </a:t>
+            </a:r>
+            <a:r>
+              <a:rPr kumimoji="0" lang="en-US" sz="800" b="0" i="0" u="none" strike="noStrike" kern="1200" cap="none" spc="0" normalizeH="0" baseline="0" noProof="0" dirty="0" err="1" smtClean="0">
+                <a:ln>
+                  <a:noFill/>
+                </a:ln>
+                <a:solidFill>
+                  <a:prstClr val="black"/>
+                </a:solidFill>
+                <a:effectLst/>
+                <a:uLnTx/>
+                <a:uFillTx/>
+                <a:latin typeface="Book Antiqua"/>
+                <a:ea typeface="+mn-ea"/>
+                <a:cs typeface="Book Antiqua"/>
+              </a:rPr>
+              <a:t>ggggg</a:t>
+            </a:r>
+            <a:r>
+              <a:rPr kumimoji="0" lang="en-US" sz="800" b="0" i="0" u="none" strike="noStrike" kern="1200" cap="none" spc="0" normalizeH="0" baseline="0" noProof="0" dirty="0" smtClean="0">
+                <a:ln>
+                  <a:noFill/>
+                </a:ln>
+                <a:solidFill>
+                  <a:prstClr val="black"/>
+                </a:solidFill>
+                <a:effectLst/>
+                <a:uLnTx/>
+                <a:uFillTx/>
+                <a:latin typeface="Book Antiqua"/>
+                <a:ea typeface="+mn-ea"/>
+                <a:cs typeface="Book Antiqua"/>
+              </a:rPr>
+              <a:t> </a:t>
+            </a:r>
+            <a:r>
+              <a:rPr kumimoji="0" lang="en-US" sz="800" b="0" i="0" u="none" strike="noStrike" kern="1200" cap="none" spc="0" normalizeH="0" baseline="0" noProof="0" dirty="0" err="1" smtClean="0">
+                <a:ln>
+                  <a:noFill/>
+                </a:ln>
+                <a:solidFill>
+                  <a:prstClr val="black"/>
+                </a:solidFill>
+                <a:effectLst/>
+                <a:uLnTx/>
+                <a:uFillTx/>
+                <a:latin typeface="Book Antiqua"/>
+                <a:ea typeface="+mn-ea"/>
+                <a:cs typeface="Book Antiqua"/>
+              </a:rPr>
+              <a:t>hhhh</a:t>
+            </a:r>
+            <a:r>
+              <a:rPr kumimoji="0" lang="en-US" sz="800" b="0" i="0" u="none" strike="noStrike" kern="1200" cap="none" spc="0" normalizeH="0" baseline="0" noProof="0" dirty="0" smtClean="0">
+                <a:ln>
+                  <a:noFill/>
+                </a:ln>
+                <a:solidFill>
+                  <a:prstClr val="black"/>
+                </a:solidFill>
+                <a:effectLst/>
+                <a:uLnTx/>
+                <a:uFillTx/>
+                <a:latin typeface="Book Antiqua"/>
+                <a:ea typeface="+mn-ea"/>
+                <a:cs typeface="Book Antiqua"/>
+              </a:rPr>
+              <a:t> </a:t>
+            </a:r>
+            <a:r>
+              <a:rPr kumimoji="0" lang="en-US" sz="800" b="0" i="0" u="none" strike="noStrike" kern="1200" cap="none" spc="0" normalizeH="0" baseline="0" noProof="0" dirty="0" err="1" smtClean="0">
+                <a:ln>
+                  <a:noFill/>
+                </a:ln>
+                <a:solidFill>
+                  <a:prstClr val="black"/>
+                </a:solidFill>
+                <a:effectLst/>
+                <a:uLnTx/>
+                <a:uFillTx/>
+                <a:latin typeface="Book Antiqua"/>
+                <a:ea typeface="+mn-ea"/>
+                <a:cs typeface="Book Antiqua"/>
+              </a:rPr>
+              <a:t>iiii</a:t>
+            </a:r>
+            <a:r>
+              <a:rPr kumimoji="0" lang="en-US" sz="800" b="0" i="0" u="none" strike="noStrike" kern="1200" cap="none" spc="0" normalizeH="0" baseline="0" noProof="0" dirty="0" smtClean="0">
+                <a:ln>
+                  <a:noFill/>
+                </a:ln>
+                <a:solidFill>
+                  <a:prstClr val="black"/>
+                </a:solidFill>
+                <a:effectLst/>
+                <a:uLnTx/>
+                <a:uFillTx/>
+                <a:latin typeface="Book Antiqua"/>
+                <a:ea typeface="+mn-ea"/>
+                <a:cs typeface="Book Antiqua"/>
+              </a:rPr>
+              <a:t>.</a:t>
             </a:r>
           </a:p>
           <a:p>
@@ -28153,7 +28408,7 @@
   </p:txStyles>
   <p:extLst>
     <p:ext uri="{27BBF7A9-308A-43DC-89C8-2F10F3537804}">
-      <p15:sldGuideLst xmlns="" xmlns:p15="http://schemas.microsoft.com/office/powerpoint/2012/main">
+      <p15:sldGuideLst xmlns:p15="http://schemas.microsoft.com/office/powerpoint/2012/main" xmlns="">
         <p15:guide id="1" pos="1638" userDrawn="1">
           <p15:clr>
             <a:srgbClr val="F26B43"/>
@@ -28853,7 +29108,7 @@
   </p:txStyles>
   <p:extLst>
     <p:ext uri="{27BBF7A9-308A-43DC-89C8-2F10F3537804}">
-      <p15:sldGuideLst xmlns="" xmlns:p15="http://schemas.microsoft.com/office/powerpoint/2012/main">
+      <p15:sldGuideLst xmlns:p15="http://schemas.microsoft.com/office/powerpoint/2012/main" xmlns="">
         <p15:guide id="1" pos="1638" userDrawn="1">
           <p15:clr>
             <a:srgbClr val="F26B43"/>
@@ -29608,7 +29863,7 @@
   </p:txStyles>
   <p:extLst>
     <p:ext uri="{27BBF7A9-308A-43DC-89C8-2F10F3537804}">
-      <p15:sldGuideLst xmlns="" xmlns:p15="http://schemas.microsoft.com/office/powerpoint/2012/main">
+      <p15:sldGuideLst xmlns:p15="http://schemas.microsoft.com/office/powerpoint/2012/main" xmlns="">
         <p15:guide id="1" pos="1638" userDrawn="1">
           <p15:clr>
             <a:srgbClr val="F26B43"/>
@@ -31080,7 +31335,7 @@
   </p:txStyles>
   <p:extLst>
     <p:ext uri="{27BBF7A9-308A-43DC-89C8-2F10F3537804}">
-      <p15:sldGuideLst xmlns="" xmlns:p15="http://schemas.microsoft.com/office/powerpoint/2012/main">
+      <p15:sldGuideLst xmlns:p15="http://schemas.microsoft.com/office/powerpoint/2012/main" xmlns="">
         <p15:guide id="1" pos="1638" userDrawn="1">
           <p15:clr>
             <a:srgbClr val="F26B43"/>
@@ -33156,21 +33411,21 @@
                 <a:gridCol w="786177">
                   <a:extLst>
                     <a:ext uri="{9D8B030D-6E8A-4147-A177-3AD203B41FA5}">
-                      <a16:colId xmlns="" xmlns:a16="http://schemas.microsoft.com/office/drawing/2014/main" val="20000"/>
+                      <a16:colId xmlns:a16="http://schemas.microsoft.com/office/drawing/2014/main" xmlns="" val="20000"/>
                     </a:ext>
                   </a:extLst>
                 </a:gridCol>
                 <a:gridCol w="486538">
                   <a:extLst>
                     <a:ext uri="{9D8B030D-6E8A-4147-A177-3AD203B41FA5}">
-                      <a16:colId xmlns="" xmlns:a16="http://schemas.microsoft.com/office/drawing/2014/main" val="20001"/>
+                      <a16:colId xmlns:a16="http://schemas.microsoft.com/office/drawing/2014/main" xmlns="" val="20001"/>
                     </a:ext>
                   </a:extLst>
                 </a:gridCol>
                 <a:gridCol w="1194130">
                   <a:extLst>
                     <a:ext uri="{9D8B030D-6E8A-4147-A177-3AD203B41FA5}">
-                      <a16:colId xmlns="" xmlns:a16="http://schemas.microsoft.com/office/drawing/2014/main" val="20002"/>
+                      <a16:colId xmlns:a16="http://schemas.microsoft.com/office/drawing/2014/main" xmlns="" val="20002"/>
                     </a:ext>
                   </a:extLst>
                 </a:gridCol>
@@ -33367,7 +33622,7 @@
                 </a:tc>
                 <a:extLst>
                   <a:ext uri="{0D108BD9-81ED-4DB2-BD59-A6C34878D82A}">
-                    <a16:rowId xmlns="" xmlns:a16="http://schemas.microsoft.com/office/drawing/2014/main" val="10000"/>
+                    <a16:rowId xmlns:a16="http://schemas.microsoft.com/office/drawing/2014/main" xmlns="" val="10000"/>
                   </a:ext>
                 </a:extLst>
               </a:tr>
@@ -33518,7 +33773,7 @@
                 </a:tc>
                 <a:extLst>
                   <a:ext uri="{0D108BD9-81ED-4DB2-BD59-A6C34878D82A}">
-                    <a16:rowId xmlns="" xmlns:a16="http://schemas.microsoft.com/office/drawing/2014/main" val="10001"/>
+                    <a16:rowId xmlns:a16="http://schemas.microsoft.com/office/drawing/2014/main" xmlns="" val="10001"/>
                   </a:ext>
                 </a:extLst>
               </a:tr>
@@ -33669,7 +33924,7 @@
                 </a:tc>
                 <a:extLst>
                   <a:ext uri="{0D108BD9-81ED-4DB2-BD59-A6C34878D82A}">
-                    <a16:rowId xmlns="" xmlns:a16="http://schemas.microsoft.com/office/drawing/2014/main" val="10002"/>
+                    <a16:rowId xmlns:a16="http://schemas.microsoft.com/office/drawing/2014/main" xmlns="" val="10002"/>
                   </a:ext>
                 </a:extLst>
               </a:tr>
@@ -33820,7 +34075,7 @@
                 </a:tc>
                 <a:extLst>
                   <a:ext uri="{0D108BD9-81ED-4DB2-BD59-A6C34878D82A}">
-                    <a16:rowId xmlns="" xmlns:a16="http://schemas.microsoft.com/office/drawing/2014/main" val="10003"/>
+                    <a16:rowId xmlns:a16="http://schemas.microsoft.com/office/drawing/2014/main" xmlns="" val="10003"/>
                   </a:ext>
                 </a:extLst>
               </a:tr>
@@ -33971,7 +34226,7 @@
                 </a:tc>
                 <a:extLst>
                   <a:ext uri="{0D108BD9-81ED-4DB2-BD59-A6C34878D82A}">
-                    <a16:rowId xmlns="" xmlns:a16="http://schemas.microsoft.com/office/drawing/2014/main" val="10004"/>
+                    <a16:rowId xmlns:a16="http://schemas.microsoft.com/office/drawing/2014/main" xmlns="" val="10004"/>
                   </a:ext>
                 </a:extLst>
               </a:tr>
@@ -34122,7 +34377,7 @@
                 </a:tc>
                 <a:extLst>
                   <a:ext uri="{0D108BD9-81ED-4DB2-BD59-A6C34878D82A}">
-                    <a16:rowId xmlns="" xmlns:a16="http://schemas.microsoft.com/office/drawing/2014/main" val="10005"/>
+                    <a16:rowId xmlns:a16="http://schemas.microsoft.com/office/drawing/2014/main" xmlns="" val="10005"/>
                   </a:ext>
                 </a:extLst>
               </a:tr>
@@ -34273,7 +34528,7 @@
                 </a:tc>
                 <a:extLst>
                   <a:ext uri="{0D108BD9-81ED-4DB2-BD59-A6C34878D82A}">
-                    <a16:rowId xmlns="" xmlns:a16="http://schemas.microsoft.com/office/drawing/2014/main" val="10006"/>
+                    <a16:rowId xmlns:a16="http://schemas.microsoft.com/office/drawing/2014/main" xmlns="" val="10006"/>
                   </a:ext>
                 </a:extLst>
               </a:tr>
@@ -34424,7 +34679,7 @@
                 </a:tc>
                 <a:extLst>
                   <a:ext uri="{0D108BD9-81ED-4DB2-BD59-A6C34878D82A}">
-                    <a16:rowId xmlns="" xmlns:a16="http://schemas.microsoft.com/office/drawing/2014/main" val="10007"/>
+                    <a16:rowId xmlns:a16="http://schemas.microsoft.com/office/drawing/2014/main" xmlns="" val="10007"/>
                   </a:ext>
                 </a:extLst>
               </a:tr>
@@ -34575,7 +34830,7 @@
                 </a:tc>
                 <a:extLst>
                   <a:ext uri="{0D108BD9-81ED-4DB2-BD59-A6C34878D82A}">
-                    <a16:rowId xmlns="" xmlns:a16="http://schemas.microsoft.com/office/drawing/2014/main" val="10008"/>
+                    <a16:rowId xmlns:a16="http://schemas.microsoft.com/office/drawing/2014/main" xmlns="" val="10008"/>
                   </a:ext>
                 </a:extLst>
               </a:tr>
@@ -34726,7 +34981,7 @@
                 </a:tc>
                 <a:extLst>
                   <a:ext uri="{0D108BD9-81ED-4DB2-BD59-A6C34878D82A}">
-                    <a16:rowId xmlns="" xmlns:a16="http://schemas.microsoft.com/office/drawing/2014/main" val="10009"/>
+                    <a16:rowId xmlns:a16="http://schemas.microsoft.com/office/drawing/2014/main" xmlns="" val="10009"/>
                   </a:ext>
                 </a:extLst>
               </a:tr>
@@ -34877,7 +35132,7 @@
                 </a:tc>
                 <a:extLst>
                   <a:ext uri="{0D108BD9-81ED-4DB2-BD59-A6C34878D82A}">
-                    <a16:rowId xmlns="" xmlns:a16="http://schemas.microsoft.com/office/drawing/2014/main" val="10010"/>
+                    <a16:rowId xmlns:a16="http://schemas.microsoft.com/office/drawing/2014/main" xmlns="" val="10010"/>
                   </a:ext>
                 </a:extLst>
               </a:tr>
@@ -35028,7 +35283,7 @@
                 </a:tc>
                 <a:extLst>
                   <a:ext uri="{0D108BD9-81ED-4DB2-BD59-A6C34878D82A}">
-                    <a16:rowId xmlns="" xmlns:a16="http://schemas.microsoft.com/office/drawing/2014/main" val="10011"/>
+                    <a16:rowId xmlns:a16="http://schemas.microsoft.com/office/drawing/2014/main" xmlns="" val="10011"/>
                   </a:ext>
                 </a:extLst>
               </a:tr>
@@ -35179,7 +35434,7 @@
                 </a:tc>
                 <a:extLst>
                   <a:ext uri="{0D108BD9-81ED-4DB2-BD59-A6C34878D82A}">
-                    <a16:rowId xmlns="" xmlns:a16="http://schemas.microsoft.com/office/drawing/2014/main" val="10012"/>
+                    <a16:rowId xmlns:a16="http://schemas.microsoft.com/office/drawing/2014/main" xmlns="" val="10012"/>
                   </a:ext>
                 </a:extLst>
               </a:tr>
@@ -35330,7 +35585,7 @@
                 </a:tc>
                 <a:extLst>
                   <a:ext uri="{0D108BD9-81ED-4DB2-BD59-A6C34878D82A}">
-                    <a16:rowId xmlns="" xmlns:a16="http://schemas.microsoft.com/office/drawing/2014/main" val="10013"/>
+                    <a16:rowId xmlns:a16="http://schemas.microsoft.com/office/drawing/2014/main" xmlns="" val="10013"/>
                   </a:ext>
                 </a:extLst>
               </a:tr>
@@ -35481,7 +35736,7 @@
                 </a:tc>
                 <a:extLst>
                   <a:ext uri="{0D108BD9-81ED-4DB2-BD59-A6C34878D82A}">
-                    <a16:rowId xmlns="" xmlns:a16="http://schemas.microsoft.com/office/drawing/2014/main" val="10014"/>
+                    <a16:rowId xmlns:a16="http://schemas.microsoft.com/office/drawing/2014/main" xmlns="" val="10014"/>
                   </a:ext>
                 </a:extLst>
               </a:tr>
@@ -35632,7 +35887,7 @@
                 </a:tc>
                 <a:extLst>
                   <a:ext uri="{0D108BD9-81ED-4DB2-BD59-A6C34878D82A}">
-                    <a16:rowId xmlns="" xmlns:a16="http://schemas.microsoft.com/office/drawing/2014/main" val="10015"/>
+                    <a16:rowId xmlns:a16="http://schemas.microsoft.com/office/drawing/2014/main" xmlns="" val="10015"/>
                   </a:ext>
                 </a:extLst>
               </a:tr>
@@ -35668,21 +35923,21 @@
                 <a:gridCol w="786177">
                   <a:extLst>
                     <a:ext uri="{9D8B030D-6E8A-4147-A177-3AD203B41FA5}">
-                      <a16:colId xmlns="" xmlns:a16="http://schemas.microsoft.com/office/drawing/2014/main" val="20000"/>
+                      <a16:colId xmlns:a16="http://schemas.microsoft.com/office/drawing/2014/main" xmlns="" val="20000"/>
                     </a:ext>
                   </a:extLst>
                 </a:gridCol>
                 <a:gridCol w="486538">
                   <a:extLst>
                     <a:ext uri="{9D8B030D-6E8A-4147-A177-3AD203B41FA5}">
-                      <a16:colId xmlns="" xmlns:a16="http://schemas.microsoft.com/office/drawing/2014/main" val="20001"/>
+                      <a16:colId xmlns:a16="http://schemas.microsoft.com/office/drawing/2014/main" xmlns="" val="20001"/>
                     </a:ext>
                   </a:extLst>
                 </a:gridCol>
                 <a:gridCol w="1194130">
                   <a:extLst>
                     <a:ext uri="{9D8B030D-6E8A-4147-A177-3AD203B41FA5}">
-                      <a16:colId xmlns="" xmlns:a16="http://schemas.microsoft.com/office/drawing/2014/main" val="20002"/>
+                      <a16:colId xmlns:a16="http://schemas.microsoft.com/office/drawing/2014/main" xmlns="" val="20002"/>
                     </a:ext>
                   </a:extLst>
                 </a:gridCol>
@@ -35879,7 +36134,7 @@
                 </a:tc>
                 <a:extLst>
                   <a:ext uri="{0D108BD9-81ED-4DB2-BD59-A6C34878D82A}">
-                    <a16:rowId xmlns="" xmlns:a16="http://schemas.microsoft.com/office/drawing/2014/main" val="10000"/>
+                    <a16:rowId xmlns:a16="http://schemas.microsoft.com/office/drawing/2014/main" xmlns="" val="10000"/>
                   </a:ext>
                 </a:extLst>
               </a:tr>
@@ -36030,7 +36285,7 @@
                 </a:tc>
                 <a:extLst>
                   <a:ext uri="{0D108BD9-81ED-4DB2-BD59-A6C34878D82A}">
-                    <a16:rowId xmlns="" xmlns:a16="http://schemas.microsoft.com/office/drawing/2014/main" val="10001"/>
+                    <a16:rowId xmlns:a16="http://schemas.microsoft.com/office/drawing/2014/main" xmlns="" val="10001"/>
                   </a:ext>
                 </a:extLst>
               </a:tr>
@@ -36181,7 +36436,7 @@
                 </a:tc>
                 <a:extLst>
                   <a:ext uri="{0D108BD9-81ED-4DB2-BD59-A6C34878D82A}">
-                    <a16:rowId xmlns="" xmlns:a16="http://schemas.microsoft.com/office/drawing/2014/main" val="10002"/>
+                    <a16:rowId xmlns:a16="http://schemas.microsoft.com/office/drawing/2014/main" xmlns="" val="10002"/>
                   </a:ext>
                 </a:extLst>
               </a:tr>
@@ -36332,7 +36587,7 @@
                 </a:tc>
                 <a:extLst>
                   <a:ext uri="{0D108BD9-81ED-4DB2-BD59-A6C34878D82A}">
-                    <a16:rowId xmlns="" xmlns:a16="http://schemas.microsoft.com/office/drawing/2014/main" val="10003"/>
+                    <a16:rowId xmlns:a16="http://schemas.microsoft.com/office/drawing/2014/main" xmlns="" val="10003"/>
                   </a:ext>
                 </a:extLst>
               </a:tr>
@@ -36483,7 +36738,7 @@
                 </a:tc>
                 <a:extLst>
                   <a:ext uri="{0D108BD9-81ED-4DB2-BD59-A6C34878D82A}">
-                    <a16:rowId xmlns="" xmlns:a16="http://schemas.microsoft.com/office/drawing/2014/main" val="10004"/>
+                    <a16:rowId xmlns:a16="http://schemas.microsoft.com/office/drawing/2014/main" xmlns="" val="10004"/>
                   </a:ext>
                 </a:extLst>
               </a:tr>
@@ -36634,7 +36889,7 @@
                 </a:tc>
                 <a:extLst>
                   <a:ext uri="{0D108BD9-81ED-4DB2-BD59-A6C34878D82A}">
-                    <a16:rowId xmlns="" xmlns:a16="http://schemas.microsoft.com/office/drawing/2014/main" val="10005"/>
+                    <a16:rowId xmlns:a16="http://schemas.microsoft.com/office/drawing/2014/main" xmlns="" val="10005"/>
                   </a:ext>
                 </a:extLst>
               </a:tr>
@@ -36785,7 +37040,7 @@
                 </a:tc>
                 <a:extLst>
                   <a:ext uri="{0D108BD9-81ED-4DB2-BD59-A6C34878D82A}">
-                    <a16:rowId xmlns="" xmlns:a16="http://schemas.microsoft.com/office/drawing/2014/main" val="10006"/>
+                    <a16:rowId xmlns:a16="http://schemas.microsoft.com/office/drawing/2014/main" xmlns="" val="10006"/>
                   </a:ext>
                 </a:extLst>
               </a:tr>
@@ -36936,7 +37191,7 @@
                 </a:tc>
                 <a:extLst>
                   <a:ext uri="{0D108BD9-81ED-4DB2-BD59-A6C34878D82A}">
-                    <a16:rowId xmlns="" xmlns:a16="http://schemas.microsoft.com/office/drawing/2014/main" val="10007"/>
+                    <a16:rowId xmlns:a16="http://schemas.microsoft.com/office/drawing/2014/main" xmlns="" val="10007"/>
                   </a:ext>
                 </a:extLst>
               </a:tr>
@@ -37087,7 +37342,7 @@
                 </a:tc>
                 <a:extLst>
                   <a:ext uri="{0D108BD9-81ED-4DB2-BD59-A6C34878D82A}">
-                    <a16:rowId xmlns="" xmlns:a16="http://schemas.microsoft.com/office/drawing/2014/main" val="10008"/>
+                    <a16:rowId xmlns:a16="http://schemas.microsoft.com/office/drawing/2014/main" xmlns="" val="10008"/>
                   </a:ext>
                 </a:extLst>
               </a:tr>
@@ -37238,7 +37493,7 @@
                 </a:tc>
                 <a:extLst>
                   <a:ext uri="{0D108BD9-81ED-4DB2-BD59-A6C34878D82A}">
-                    <a16:rowId xmlns="" xmlns:a16="http://schemas.microsoft.com/office/drawing/2014/main" val="10009"/>
+                    <a16:rowId xmlns:a16="http://schemas.microsoft.com/office/drawing/2014/main" xmlns="" val="10009"/>
                   </a:ext>
                 </a:extLst>
               </a:tr>
@@ -37389,7 +37644,7 @@
                 </a:tc>
                 <a:extLst>
                   <a:ext uri="{0D108BD9-81ED-4DB2-BD59-A6C34878D82A}">
-                    <a16:rowId xmlns="" xmlns:a16="http://schemas.microsoft.com/office/drawing/2014/main" val="10010"/>
+                    <a16:rowId xmlns:a16="http://schemas.microsoft.com/office/drawing/2014/main" xmlns="" val="10010"/>
                   </a:ext>
                 </a:extLst>
               </a:tr>
@@ -37540,7 +37795,7 @@
                 </a:tc>
                 <a:extLst>
                   <a:ext uri="{0D108BD9-81ED-4DB2-BD59-A6C34878D82A}">
-                    <a16:rowId xmlns="" xmlns:a16="http://schemas.microsoft.com/office/drawing/2014/main" val="10011"/>
+                    <a16:rowId xmlns:a16="http://schemas.microsoft.com/office/drawing/2014/main" xmlns="" val="10011"/>
                   </a:ext>
                 </a:extLst>
               </a:tr>
@@ -37691,7 +37946,7 @@
                 </a:tc>
                 <a:extLst>
                   <a:ext uri="{0D108BD9-81ED-4DB2-BD59-A6C34878D82A}">
-                    <a16:rowId xmlns="" xmlns:a16="http://schemas.microsoft.com/office/drawing/2014/main" val="10012"/>
+                    <a16:rowId xmlns:a16="http://schemas.microsoft.com/office/drawing/2014/main" xmlns="" val="10012"/>
                   </a:ext>
                 </a:extLst>
               </a:tr>
@@ -37842,7 +38097,7 @@
                 </a:tc>
                 <a:extLst>
                   <a:ext uri="{0D108BD9-81ED-4DB2-BD59-A6C34878D82A}">
-                    <a16:rowId xmlns="" xmlns:a16="http://schemas.microsoft.com/office/drawing/2014/main" val="10013"/>
+                    <a16:rowId xmlns:a16="http://schemas.microsoft.com/office/drawing/2014/main" xmlns="" val="10013"/>
                   </a:ext>
                 </a:extLst>
               </a:tr>
@@ -37993,7 +38248,7 @@
                 </a:tc>
                 <a:extLst>
                   <a:ext uri="{0D108BD9-81ED-4DB2-BD59-A6C34878D82A}">
-                    <a16:rowId xmlns="" xmlns:a16="http://schemas.microsoft.com/office/drawing/2014/main" val="10014"/>
+                    <a16:rowId xmlns:a16="http://schemas.microsoft.com/office/drawing/2014/main" xmlns="" val="10014"/>
                   </a:ext>
                 </a:extLst>
               </a:tr>
@@ -38357,13 +38612,18 @@
               <a:buNone/>
             </a:pPr>
             <a:r>
-              <a:rPr lang="en-US" b="1" dirty="0">
+              <a:rPr lang="en-US" b="1" dirty="0" smtClean="0">
                 <a:solidFill>
                   <a:schemeClr val="accent5"/>
                 </a:solidFill>
               </a:rPr>
-              <a:t>assimilation </a:t>
-            </a:r>
+              <a:t>assimilation</a:t>
+            </a:r>
+            <a:endParaRPr lang="en-US" b="1" dirty="0">
+              <a:solidFill>
+                <a:schemeClr val="accent5"/>
+              </a:solidFill>
+            </a:endParaRPr>
           </a:p>
           <a:p>
             <a:pPr marL="0" indent="0">
@@ -38422,51 +38682,48 @@
               <a:buNone/>
             </a:pPr>
             <a:r>
-              <a:rPr lang="en-US" b="1" dirty="0">
+              <a:rPr lang="en-US" b="1" dirty="0" err="1" smtClean="0">
                 <a:solidFill>
                   <a:schemeClr val="accent5"/>
                 </a:solidFill>
               </a:rPr>
-              <a:t>assimilation </a:t>
-            </a:r>
+              <a:t>imilation</a:t>
+            </a:r>
+            <a:endParaRPr lang="en-US" b="1" dirty="0">
+              <a:solidFill>
+                <a:schemeClr val="accent5"/>
+              </a:solidFill>
+            </a:endParaRPr>
           </a:p>
           <a:p>
             <a:pPr marL="0" indent="0">
               <a:buNone/>
             </a:pPr>
             <a:r>
-              <a:rPr lang="en-US" b="1" dirty="0">
+              <a:rPr lang="en-US" b="1" dirty="0" smtClean="0">
                 <a:solidFill>
                   <a:schemeClr val="accent5"/>
                 </a:solidFill>
               </a:rPr>
-              <a:t>emigrate</a:t>
-            </a:r>
+              <a:t>grate</a:t>
+            </a:r>
+            <a:endParaRPr lang="en-US" b="1" dirty="0">
+              <a:solidFill>
+                <a:schemeClr val="accent5"/>
+              </a:solidFill>
+            </a:endParaRPr>
           </a:p>
           <a:p>
             <a:pPr marL="0" indent="0">
               <a:buNone/>
             </a:pPr>
             <a:r>
-              <a:rPr lang="en-US" b="1" dirty="0">
+              <a:rPr lang="en-US" b="1" dirty="0" smtClean="0">
                 <a:solidFill>
                   <a:schemeClr val="accent5"/>
                 </a:solidFill>
               </a:rPr>
-              <a:t>mandate</a:t>
-            </a:r>
-          </a:p>
-          <a:p>
-            <a:pPr marL="0" indent="0">
-              <a:buNone/>
-            </a:pPr>
-            <a:r>
-              <a:rPr lang="en-US" b="1" dirty="0">
-                <a:solidFill>
-                  <a:schemeClr val="accent5"/>
-                </a:solidFill>
-              </a:rPr>
-              <a:t>partition</a:t>
+              <a:t>date</a:t>
             </a:r>
             <a:endParaRPr lang="en-US" b="1" dirty="0">
               <a:solidFill>
@@ -43273,40 +43530,6 @@
 </file>
 
 <file path=customXml/item1.xml><?xml version="1.0" encoding="utf-8"?>
-<p:properties xmlns:p="http://schemas.microsoft.com/office/2006/metadata/properties" xmlns:xsi="http://www.w3.org/2001/XMLSchema-instance" xmlns:pc="http://schemas.microsoft.com/office/infopath/2007/PartnerControls">
-  <documentManagement>
-    <_dlc_DocId xmlns="8e8c147c-4a44-4efb-abf1-e3af25080dca">NYTQRMT4MAHZ-1-73408</_dlc_DocId>
-    <_dlc_DocIdUrl xmlns="8e8c147c-4a44-4efb-abf1-e3af25080dca">
-      <Url>http://eportal.education2020.com/Curriculum/CMath/_layouts/DocIdRedir.aspx?ID=NYTQRMT4MAHZ-1-73408</Url>
-      <Description>NYTQRMT4MAHZ-1-73408</Description>
-    </_dlc_DocIdUrl>
-    <Target_x0020_Audiences xmlns="e488ce5d-f489-49a9-8091-c8b3fdc3ce56" xsi:nil="true"/>
-    <Order0 xmlns="e488ce5d-f489-49a9-8091-c8b3fdc3ce56" xsi:nil="true"/>
-    <TaxCatchAll xmlns="8e8c147c-4a44-4efb-abf1-e3af25080dca">
-      <Value>7432</Value>
-    </TaxCatchAll>
-    <TaxKeywordTaxHTField xmlns="8e8c147c-4a44-4efb-abf1-e3af25080dca">
-      <Terms xmlns="http://schemas.microsoft.com/office/infopath/2007/PartnerControls">
-        <TermInfo xmlns="http://schemas.microsoft.com/office/infopath/2007/PartnerControls">
-          <TermName xmlns="http://schemas.microsoft.com/office/infopath/2007/PartnerControls">Lesson Shell</TermName>
-          <TermId xmlns="http://schemas.microsoft.com/office/infopath/2007/PartnerControls">7b823159-1b76-4161-b004-4b1e873e8ffe</TermId>
-        </TermInfo>
-      </Terms>
-    </TaxKeywordTaxHTField>
-  </documentManagement>
-</p:properties>
-</file>
-
-<file path=customXml/item2.xml><?xml version="1.0" encoding="utf-8"?>
-<?mso-contentType ?>
-<FormTemplates xmlns="http://schemas.microsoft.com/sharepoint/v3/contenttype/forms">
-  <Display>DocumentLibraryForm</Display>
-  <Edit>DocumentLibraryForm</Edit>
-  <New>DocumentLibraryForm</New>
-</FormTemplates>
-</file>
-
-<file path=customXml/item3.xml><?xml version="1.0" encoding="utf-8"?>
 <?mso-contentType ?>
 <spe:Receivers xmlns:spe="http://schemas.microsoft.com/sharepoint/events">
   <Receiver>
@@ -43350,6 +43573,40 @@
     <Filter/>
   </Receiver>
 </spe:Receivers>
+</file>
+
+<file path=customXml/item2.xml><?xml version="1.0" encoding="utf-8"?>
+<?mso-contentType ?>
+<FormTemplates xmlns="http://schemas.microsoft.com/sharepoint/v3/contenttype/forms">
+  <Display>DocumentLibraryForm</Display>
+  <Edit>DocumentLibraryForm</Edit>
+  <New>DocumentLibraryForm</New>
+</FormTemplates>
+</file>
+
+<file path=customXml/item3.xml><?xml version="1.0" encoding="utf-8"?>
+<p:properties xmlns:p="http://schemas.microsoft.com/office/2006/metadata/properties" xmlns:xsi="http://www.w3.org/2001/XMLSchema-instance" xmlns:pc="http://schemas.microsoft.com/office/infopath/2007/PartnerControls">
+  <documentManagement>
+    <_dlc_DocId xmlns="8e8c147c-4a44-4efb-abf1-e3af25080dca">NYTQRMT4MAHZ-1-73408</_dlc_DocId>
+    <_dlc_DocIdUrl xmlns="8e8c147c-4a44-4efb-abf1-e3af25080dca">
+      <Url>http://eportal.education2020.com/Curriculum/CMath/_layouts/DocIdRedir.aspx?ID=NYTQRMT4MAHZ-1-73408</Url>
+      <Description>NYTQRMT4MAHZ-1-73408</Description>
+    </_dlc_DocIdUrl>
+    <Target_x0020_Audiences xmlns="e488ce5d-f489-49a9-8091-c8b3fdc3ce56" xsi:nil="true"/>
+    <Order0 xmlns="e488ce5d-f489-49a9-8091-c8b3fdc3ce56" xsi:nil="true"/>
+    <TaxCatchAll xmlns="8e8c147c-4a44-4efb-abf1-e3af25080dca">
+      <Value>7432</Value>
+    </TaxCatchAll>
+    <TaxKeywordTaxHTField xmlns="8e8c147c-4a44-4efb-abf1-e3af25080dca">
+      <Terms xmlns="http://schemas.microsoft.com/office/infopath/2007/PartnerControls">
+        <TermInfo xmlns="http://schemas.microsoft.com/office/infopath/2007/PartnerControls">
+          <TermName xmlns="http://schemas.microsoft.com/office/infopath/2007/PartnerControls">Lesson Shell</TermName>
+          <TermId xmlns="http://schemas.microsoft.com/office/infopath/2007/PartnerControls">7b823159-1b76-4161-b004-4b1e873e8ffe</TermId>
+        </TermInfo>
+      </Terms>
+    </TaxKeywordTaxHTField>
+  </documentManagement>
+</p:properties>
 </file>
 
 <file path=customXml/item4.xml><?xml version="1.0" encoding="utf-8"?>
@@ -43537,18 +43794,10 @@
 </file>
 
 <file path=customXml/itemProps1.xml><?xml version="1.0" encoding="utf-8"?>
-<ds:datastoreItem xmlns:ds="http://schemas.openxmlformats.org/officeDocument/2006/customXml" ds:itemID="{05D38530-3CCC-436F-BB00-72BDEC3E8657}">
+<ds:datastoreItem xmlns:ds="http://schemas.openxmlformats.org/officeDocument/2006/customXml" ds:itemID="{1EECF812-387C-4DE4-B9A3-9F7A72D3EC4A}">
   <ds:schemaRefs>
-    <ds:schemaRef ds:uri="http://schemas.microsoft.com/office/2006/documentManagement/types"/>
-    <ds:schemaRef ds:uri="8e8c147c-4a44-4efb-abf1-e3af25080dca"/>
-    <ds:schemaRef ds:uri="e488ce5d-f489-49a9-8091-c8b3fdc3ce56"/>
-    <ds:schemaRef ds:uri="http://schemas.openxmlformats.org/package/2006/metadata/core-properties"/>
-    <ds:schemaRef ds:uri="http://purl.org/dc/dcmitype/"/>
-    <ds:schemaRef ds:uri="http://www.w3.org/XML/1998/namespace"/>
-    <ds:schemaRef ds:uri="http://purl.org/dc/terms/"/>
-    <ds:schemaRef ds:uri="http://schemas.microsoft.com/office/2006/metadata/properties"/>
-    <ds:schemaRef ds:uri="http://schemas.microsoft.com/office/infopath/2007/PartnerControls"/>
-    <ds:schemaRef ds:uri="http://purl.org/dc/elements/1.1/"/>
+    <ds:schemaRef ds:uri="http://schemas.microsoft.com/sharepoint/events"/>
+    <ds:schemaRef ds:uri="http://www.w3.org/2000/xmlns/"/>
   </ds:schemaRefs>
 </ds:datastoreItem>
 </file>
@@ -43562,10 +43811,18 @@
 </file>
 
 <file path=customXml/itemProps3.xml><?xml version="1.0" encoding="utf-8"?>
-<ds:datastoreItem xmlns:ds="http://schemas.openxmlformats.org/officeDocument/2006/customXml" ds:itemID="{1EECF812-387C-4DE4-B9A3-9F7A72D3EC4A}">
+<ds:datastoreItem xmlns:ds="http://schemas.openxmlformats.org/officeDocument/2006/customXml" ds:itemID="{05D38530-3CCC-436F-BB00-72BDEC3E8657}">
   <ds:schemaRefs>
-    <ds:schemaRef ds:uri="http://schemas.microsoft.com/sharepoint/events"/>
-    <ds:schemaRef ds:uri="http://www.w3.org/2000/xmlns/"/>
+    <ds:schemaRef ds:uri="http://schemas.microsoft.com/office/2006/documentManagement/types"/>
+    <ds:schemaRef ds:uri="8e8c147c-4a44-4efb-abf1-e3af25080dca"/>
+    <ds:schemaRef ds:uri="e488ce5d-f489-49a9-8091-c8b3fdc3ce56"/>
+    <ds:schemaRef ds:uri="http://schemas.openxmlformats.org/package/2006/metadata/core-properties"/>
+    <ds:schemaRef ds:uri="http://purl.org/dc/dcmitype/"/>
+    <ds:schemaRef ds:uri="http://www.w3.org/XML/1998/namespace"/>
+    <ds:schemaRef ds:uri="http://purl.org/dc/terms/"/>
+    <ds:schemaRef ds:uri="http://schemas.microsoft.com/office/2006/metadata/properties"/>
+    <ds:schemaRef ds:uri="http://schemas.microsoft.com/office/infopath/2007/PartnerControls"/>
+    <ds:schemaRef ds:uri="http://purl.org/dc/elements/1.1/"/>
   </ds:schemaRefs>
 </ds:datastoreItem>
 </file>

</xml_diff>

<commit_message>
Update test PowerPoint files - debug equateion/symbol bug
</commit_message>
<xml_diff>
--- a/testing_debug/test_files_symbol_equation_bug/4_0123-45-67_replace_slide_just_add_symbol_ascii_utf8.pptx
+++ b/testing_debug/test_files_symbol_equation_bug/4_0123-45-67_replace_slide_just_add_symbol_ascii_utf8.pptx
@@ -150,7 +150,7 @@
       </p14:sectionLst>
     </p:ext>
     <p:ext uri="{EFAFB233-063F-42B5-8137-9DF3F51BA10A}">
-      <p15:sldGuideLst xmlns:p15="http://schemas.microsoft.com/office/powerpoint/2012/main" xmlns="">
+      <p15:sldGuideLst xmlns="" xmlns:p15="http://schemas.microsoft.com/office/powerpoint/2012/main">
         <p15:guide id="1" orient="horz" pos="921">
           <p15:clr>
             <a:srgbClr val="A4A3A4"/>
@@ -164,7 +164,7 @@
       </p15:sldGuideLst>
     </p:ext>
     <p:ext uri="{2D200454-40CA-4A62-9FC3-DE9A4176ACB9}">
-      <p15:notesGuideLst xmlns:p15="http://schemas.microsoft.com/office/powerpoint/2012/main" xmlns="">
+      <p15:notesGuideLst xmlns="" xmlns:p15="http://schemas.microsoft.com/office/powerpoint/2012/main">
         <p15:guide id="1" orient="horz" pos="2880">
           <p15:clr>
             <a:srgbClr val="A4A3A4"/>
@@ -3048,8 +3048,56 @@
                 <a:ea typeface="+mn-ea"/>
                 <a:cs typeface="Book Antiqua"/>
               </a:rPr>
-              <a:t> zzzz.</a:t>
-            </a:r>
+              <a:t> zzzz</a:t>
+            </a:r>
+            <a:r>
+              <a:rPr kumimoji="0" lang="en-US" sz="800" b="0" i="0" u="none" strike="noStrike" kern="1200" cap="none" spc="0" normalizeH="0" baseline="0" noProof="0" dirty="0" smtClean="0">
+                <a:ln>
+                  <a:noFill/>
+                </a:ln>
+                <a:solidFill>
+                  <a:prstClr val="black"/>
+                </a:solidFill>
+                <a:effectLst/>
+                <a:uLnTx/>
+                <a:uFillTx/>
+                <a:latin typeface="Book Antiqua"/>
+                <a:ea typeface="+mn-ea"/>
+                <a:cs typeface="Book Antiqua"/>
+              </a:rPr>
+              <a:t>. </a:t>
+            </a:r>
+            <a:r>
+              <a:rPr kumimoji="0" lang="en-US" sz="800" b="0" i="0" u="none" strike="noStrike" kern="1200" cap="none" spc="0" normalizeH="0" baseline="0" noProof="0" smtClean="0">
+                <a:ln>
+                  <a:noFill/>
+                </a:ln>
+                <a:solidFill>
+                  <a:prstClr val="black"/>
+                </a:solidFill>
+                <a:effectLst/>
+                <a:uLnTx/>
+                <a:uFillTx/>
+                <a:latin typeface="Book Antiqua"/>
+                <a:ea typeface="+mn-ea"/>
+                <a:cs typeface="Book Antiqua"/>
+              </a:rPr>
+              <a:t>ˆ</a:t>
+            </a:r>
+            <a:endParaRPr kumimoji="0" lang="en-US" sz="800" b="0" i="0" u="none" strike="noStrike" kern="1200" cap="none" spc="0" normalizeH="0" baseline="0" noProof="0" dirty="0" smtClean="0">
+              <a:ln>
+                <a:noFill/>
+              </a:ln>
+              <a:solidFill>
+                <a:prstClr val="black"/>
+              </a:solidFill>
+              <a:effectLst/>
+              <a:uLnTx/>
+              <a:uFillTx/>
+              <a:latin typeface="Book Antiqua"/>
+              <a:ea typeface="+mn-ea"/>
+              <a:cs typeface="Book Antiqua"/>
+            </a:endParaRPr>
           </a:p>
           <a:p>
             <a:pPr marL="0" marR="0" lvl="0" indent="0" algn="l" defTabSz="464424" rtl="0" eaLnBrk="1" fontAlgn="auto" latinLnBrk="0" hangingPunct="1">
@@ -3242,7 +3290,7 @@
               <a:defRPr/>
             </a:pPr>
             <a:r>
-              <a:rPr kumimoji="0" lang="en-US" sz="800" b="0" i="0" u="none" strike="noStrike" kern="1200" cap="none" spc="0" normalizeH="0" baseline="0" noProof="0" smtClean="0">
+              <a:rPr kumimoji="0" lang="en-US" sz="800" b="0" i="0" u="none" strike="noStrike" kern="1200" cap="none" spc="0" normalizeH="0" baseline="0" noProof="0" dirty="0" smtClean="0">
                 <a:ln>
                   <a:noFill/>
                 </a:ln>
@@ -3256,24 +3304,7 @@
                 <a:ea typeface="+mn-ea"/>
                 <a:cs typeface="Book Antiqua"/>
               </a:rPr>
-              <a:t>date </a:t>
-            </a:r>
-            <a:r>
-              <a:rPr kumimoji="0" lang="en-US" sz="800" b="0" i="0" u="none" strike="noStrike" kern="1200" cap="none" spc="0" normalizeH="0" baseline="0" noProof="0" dirty="0" smtClean="0">
-                <a:ln>
-                  <a:noFill/>
-                </a:ln>
-                <a:solidFill>
-                  <a:prstClr val="black"/>
-                </a:solidFill>
-                <a:effectLst/>
-                <a:uLnTx/>
-                <a:uFillTx/>
-                <a:latin typeface="Book Antiqua"/>
-                <a:ea typeface="+mn-ea"/>
-                <a:cs typeface="Book Antiqua"/>
-              </a:rPr>
-              <a:t>– </a:t>
+              <a:t>date – </a:t>
             </a:r>
             <a:r>
               <a:rPr kumimoji="0" lang="en-US" sz="800" b="0" i="0" u="none" strike="noStrike" kern="1200" cap="none" spc="0" normalizeH="0" baseline="0" noProof="0" dirty="0" err="1" smtClean="0">
@@ -28408,7 +28439,7 @@
   </p:txStyles>
   <p:extLst>
     <p:ext uri="{27BBF7A9-308A-43DC-89C8-2F10F3537804}">
-      <p15:sldGuideLst xmlns:p15="http://schemas.microsoft.com/office/powerpoint/2012/main" xmlns="">
+      <p15:sldGuideLst xmlns="" xmlns:p15="http://schemas.microsoft.com/office/powerpoint/2012/main">
         <p15:guide id="1" pos="1638" userDrawn="1">
           <p15:clr>
             <a:srgbClr val="F26B43"/>
@@ -29108,7 +29139,7 @@
   </p:txStyles>
   <p:extLst>
     <p:ext uri="{27BBF7A9-308A-43DC-89C8-2F10F3537804}">
-      <p15:sldGuideLst xmlns:p15="http://schemas.microsoft.com/office/powerpoint/2012/main" xmlns="">
+      <p15:sldGuideLst xmlns="" xmlns:p15="http://schemas.microsoft.com/office/powerpoint/2012/main">
         <p15:guide id="1" pos="1638" userDrawn="1">
           <p15:clr>
             <a:srgbClr val="F26B43"/>
@@ -29863,7 +29894,7 @@
   </p:txStyles>
   <p:extLst>
     <p:ext uri="{27BBF7A9-308A-43DC-89C8-2F10F3537804}">
-      <p15:sldGuideLst xmlns:p15="http://schemas.microsoft.com/office/powerpoint/2012/main" xmlns="">
+      <p15:sldGuideLst xmlns="" xmlns:p15="http://schemas.microsoft.com/office/powerpoint/2012/main">
         <p15:guide id="1" pos="1638" userDrawn="1">
           <p15:clr>
             <a:srgbClr val="F26B43"/>
@@ -31335,7 +31366,7 @@
   </p:txStyles>
   <p:extLst>
     <p:ext uri="{27BBF7A9-308A-43DC-89C8-2F10F3537804}">
-      <p15:sldGuideLst xmlns:p15="http://schemas.microsoft.com/office/powerpoint/2012/main" xmlns="">
+      <p15:sldGuideLst xmlns="" xmlns:p15="http://schemas.microsoft.com/office/powerpoint/2012/main">
         <p15:guide id="1" pos="1638" userDrawn="1">
           <p15:clr>
             <a:srgbClr val="F26B43"/>
@@ -33411,21 +33442,21 @@
                 <a:gridCol w="786177">
                   <a:extLst>
                     <a:ext uri="{9D8B030D-6E8A-4147-A177-3AD203B41FA5}">
-                      <a16:colId xmlns:a16="http://schemas.microsoft.com/office/drawing/2014/main" xmlns="" val="20000"/>
+                      <a16:colId xmlns="" xmlns:a16="http://schemas.microsoft.com/office/drawing/2014/main" val="20000"/>
                     </a:ext>
                   </a:extLst>
                 </a:gridCol>
                 <a:gridCol w="486538">
                   <a:extLst>
                     <a:ext uri="{9D8B030D-6E8A-4147-A177-3AD203B41FA5}">
-                      <a16:colId xmlns:a16="http://schemas.microsoft.com/office/drawing/2014/main" xmlns="" val="20001"/>
+                      <a16:colId xmlns="" xmlns:a16="http://schemas.microsoft.com/office/drawing/2014/main" val="20001"/>
                     </a:ext>
                   </a:extLst>
                 </a:gridCol>
                 <a:gridCol w="1194130">
                   <a:extLst>
                     <a:ext uri="{9D8B030D-6E8A-4147-A177-3AD203B41FA5}">
-                      <a16:colId xmlns:a16="http://schemas.microsoft.com/office/drawing/2014/main" xmlns="" val="20002"/>
+                      <a16:colId xmlns="" xmlns:a16="http://schemas.microsoft.com/office/drawing/2014/main" val="20002"/>
                     </a:ext>
                   </a:extLst>
                 </a:gridCol>
@@ -33622,7 +33653,7 @@
                 </a:tc>
                 <a:extLst>
                   <a:ext uri="{0D108BD9-81ED-4DB2-BD59-A6C34878D82A}">
-                    <a16:rowId xmlns:a16="http://schemas.microsoft.com/office/drawing/2014/main" xmlns="" val="10000"/>
+                    <a16:rowId xmlns="" xmlns:a16="http://schemas.microsoft.com/office/drawing/2014/main" val="10000"/>
                   </a:ext>
                 </a:extLst>
               </a:tr>
@@ -33773,7 +33804,7 @@
                 </a:tc>
                 <a:extLst>
                   <a:ext uri="{0D108BD9-81ED-4DB2-BD59-A6C34878D82A}">
-                    <a16:rowId xmlns:a16="http://schemas.microsoft.com/office/drawing/2014/main" xmlns="" val="10001"/>
+                    <a16:rowId xmlns="" xmlns:a16="http://schemas.microsoft.com/office/drawing/2014/main" val="10001"/>
                   </a:ext>
                 </a:extLst>
               </a:tr>
@@ -33924,7 +33955,7 @@
                 </a:tc>
                 <a:extLst>
                   <a:ext uri="{0D108BD9-81ED-4DB2-BD59-A6C34878D82A}">
-                    <a16:rowId xmlns:a16="http://schemas.microsoft.com/office/drawing/2014/main" xmlns="" val="10002"/>
+                    <a16:rowId xmlns="" xmlns:a16="http://schemas.microsoft.com/office/drawing/2014/main" val="10002"/>
                   </a:ext>
                 </a:extLst>
               </a:tr>
@@ -34075,7 +34106,7 @@
                 </a:tc>
                 <a:extLst>
                   <a:ext uri="{0D108BD9-81ED-4DB2-BD59-A6C34878D82A}">
-                    <a16:rowId xmlns:a16="http://schemas.microsoft.com/office/drawing/2014/main" xmlns="" val="10003"/>
+                    <a16:rowId xmlns="" xmlns:a16="http://schemas.microsoft.com/office/drawing/2014/main" val="10003"/>
                   </a:ext>
                 </a:extLst>
               </a:tr>
@@ -34226,7 +34257,7 @@
                 </a:tc>
                 <a:extLst>
                   <a:ext uri="{0D108BD9-81ED-4DB2-BD59-A6C34878D82A}">
-                    <a16:rowId xmlns:a16="http://schemas.microsoft.com/office/drawing/2014/main" xmlns="" val="10004"/>
+                    <a16:rowId xmlns="" xmlns:a16="http://schemas.microsoft.com/office/drawing/2014/main" val="10004"/>
                   </a:ext>
                 </a:extLst>
               </a:tr>
@@ -34377,7 +34408,7 @@
                 </a:tc>
                 <a:extLst>
                   <a:ext uri="{0D108BD9-81ED-4DB2-BD59-A6C34878D82A}">
-                    <a16:rowId xmlns:a16="http://schemas.microsoft.com/office/drawing/2014/main" xmlns="" val="10005"/>
+                    <a16:rowId xmlns="" xmlns:a16="http://schemas.microsoft.com/office/drawing/2014/main" val="10005"/>
                   </a:ext>
                 </a:extLst>
               </a:tr>
@@ -34528,7 +34559,7 @@
                 </a:tc>
                 <a:extLst>
                   <a:ext uri="{0D108BD9-81ED-4DB2-BD59-A6C34878D82A}">
-                    <a16:rowId xmlns:a16="http://schemas.microsoft.com/office/drawing/2014/main" xmlns="" val="10006"/>
+                    <a16:rowId xmlns="" xmlns:a16="http://schemas.microsoft.com/office/drawing/2014/main" val="10006"/>
                   </a:ext>
                 </a:extLst>
               </a:tr>
@@ -34679,7 +34710,7 @@
                 </a:tc>
                 <a:extLst>
                   <a:ext uri="{0D108BD9-81ED-4DB2-BD59-A6C34878D82A}">
-                    <a16:rowId xmlns:a16="http://schemas.microsoft.com/office/drawing/2014/main" xmlns="" val="10007"/>
+                    <a16:rowId xmlns="" xmlns:a16="http://schemas.microsoft.com/office/drawing/2014/main" val="10007"/>
                   </a:ext>
                 </a:extLst>
               </a:tr>
@@ -34830,7 +34861,7 @@
                 </a:tc>
                 <a:extLst>
                   <a:ext uri="{0D108BD9-81ED-4DB2-BD59-A6C34878D82A}">
-                    <a16:rowId xmlns:a16="http://schemas.microsoft.com/office/drawing/2014/main" xmlns="" val="10008"/>
+                    <a16:rowId xmlns="" xmlns:a16="http://schemas.microsoft.com/office/drawing/2014/main" val="10008"/>
                   </a:ext>
                 </a:extLst>
               </a:tr>
@@ -34981,7 +35012,7 @@
                 </a:tc>
                 <a:extLst>
                   <a:ext uri="{0D108BD9-81ED-4DB2-BD59-A6C34878D82A}">
-                    <a16:rowId xmlns:a16="http://schemas.microsoft.com/office/drawing/2014/main" xmlns="" val="10009"/>
+                    <a16:rowId xmlns="" xmlns:a16="http://schemas.microsoft.com/office/drawing/2014/main" val="10009"/>
                   </a:ext>
                 </a:extLst>
               </a:tr>
@@ -35132,7 +35163,7 @@
                 </a:tc>
                 <a:extLst>
                   <a:ext uri="{0D108BD9-81ED-4DB2-BD59-A6C34878D82A}">
-                    <a16:rowId xmlns:a16="http://schemas.microsoft.com/office/drawing/2014/main" xmlns="" val="10010"/>
+                    <a16:rowId xmlns="" xmlns:a16="http://schemas.microsoft.com/office/drawing/2014/main" val="10010"/>
                   </a:ext>
                 </a:extLst>
               </a:tr>
@@ -35283,7 +35314,7 @@
                 </a:tc>
                 <a:extLst>
                   <a:ext uri="{0D108BD9-81ED-4DB2-BD59-A6C34878D82A}">
-                    <a16:rowId xmlns:a16="http://schemas.microsoft.com/office/drawing/2014/main" xmlns="" val="10011"/>
+                    <a16:rowId xmlns="" xmlns:a16="http://schemas.microsoft.com/office/drawing/2014/main" val="10011"/>
                   </a:ext>
                 </a:extLst>
               </a:tr>
@@ -35434,7 +35465,7 @@
                 </a:tc>
                 <a:extLst>
                   <a:ext uri="{0D108BD9-81ED-4DB2-BD59-A6C34878D82A}">
-                    <a16:rowId xmlns:a16="http://schemas.microsoft.com/office/drawing/2014/main" xmlns="" val="10012"/>
+                    <a16:rowId xmlns="" xmlns:a16="http://schemas.microsoft.com/office/drawing/2014/main" val="10012"/>
                   </a:ext>
                 </a:extLst>
               </a:tr>
@@ -35585,7 +35616,7 @@
                 </a:tc>
                 <a:extLst>
                   <a:ext uri="{0D108BD9-81ED-4DB2-BD59-A6C34878D82A}">
-                    <a16:rowId xmlns:a16="http://schemas.microsoft.com/office/drawing/2014/main" xmlns="" val="10013"/>
+                    <a16:rowId xmlns="" xmlns:a16="http://schemas.microsoft.com/office/drawing/2014/main" val="10013"/>
                   </a:ext>
                 </a:extLst>
               </a:tr>
@@ -35736,7 +35767,7 @@
                 </a:tc>
                 <a:extLst>
                   <a:ext uri="{0D108BD9-81ED-4DB2-BD59-A6C34878D82A}">
-                    <a16:rowId xmlns:a16="http://schemas.microsoft.com/office/drawing/2014/main" xmlns="" val="10014"/>
+                    <a16:rowId xmlns="" xmlns:a16="http://schemas.microsoft.com/office/drawing/2014/main" val="10014"/>
                   </a:ext>
                 </a:extLst>
               </a:tr>
@@ -35887,7 +35918,7 @@
                 </a:tc>
                 <a:extLst>
                   <a:ext uri="{0D108BD9-81ED-4DB2-BD59-A6C34878D82A}">
-                    <a16:rowId xmlns:a16="http://schemas.microsoft.com/office/drawing/2014/main" xmlns="" val="10015"/>
+                    <a16:rowId xmlns="" xmlns:a16="http://schemas.microsoft.com/office/drawing/2014/main" val="10015"/>
                   </a:ext>
                 </a:extLst>
               </a:tr>
@@ -35923,21 +35954,21 @@
                 <a:gridCol w="786177">
                   <a:extLst>
                     <a:ext uri="{9D8B030D-6E8A-4147-A177-3AD203B41FA5}">
-                      <a16:colId xmlns:a16="http://schemas.microsoft.com/office/drawing/2014/main" xmlns="" val="20000"/>
+                      <a16:colId xmlns="" xmlns:a16="http://schemas.microsoft.com/office/drawing/2014/main" val="20000"/>
                     </a:ext>
                   </a:extLst>
                 </a:gridCol>
                 <a:gridCol w="486538">
                   <a:extLst>
                     <a:ext uri="{9D8B030D-6E8A-4147-A177-3AD203B41FA5}">
-                      <a16:colId xmlns:a16="http://schemas.microsoft.com/office/drawing/2014/main" xmlns="" val="20001"/>
+                      <a16:colId xmlns="" xmlns:a16="http://schemas.microsoft.com/office/drawing/2014/main" val="20001"/>
                     </a:ext>
                   </a:extLst>
                 </a:gridCol>
                 <a:gridCol w="1194130">
                   <a:extLst>
                     <a:ext uri="{9D8B030D-6E8A-4147-A177-3AD203B41FA5}">
-                      <a16:colId xmlns:a16="http://schemas.microsoft.com/office/drawing/2014/main" xmlns="" val="20002"/>
+                      <a16:colId xmlns="" xmlns:a16="http://schemas.microsoft.com/office/drawing/2014/main" val="20002"/>
                     </a:ext>
                   </a:extLst>
                 </a:gridCol>
@@ -36134,7 +36165,7 @@
                 </a:tc>
                 <a:extLst>
                   <a:ext uri="{0D108BD9-81ED-4DB2-BD59-A6C34878D82A}">
-                    <a16:rowId xmlns:a16="http://schemas.microsoft.com/office/drawing/2014/main" xmlns="" val="10000"/>
+                    <a16:rowId xmlns="" xmlns:a16="http://schemas.microsoft.com/office/drawing/2014/main" val="10000"/>
                   </a:ext>
                 </a:extLst>
               </a:tr>
@@ -36285,7 +36316,7 @@
                 </a:tc>
                 <a:extLst>
                   <a:ext uri="{0D108BD9-81ED-4DB2-BD59-A6C34878D82A}">
-                    <a16:rowId xmlns:a16="http://schemas.microsoft.com/office/drawing/2014/main" xmlns="" val="10001"/>
+                    <a16:rowId xmlns="" xmlns:a16="http://schemas.microsoft.com/office/drawing/2014/main" val="10001"/>
                   </a:ext>
                 </a:extLst>
               </a:tr>
@@ -36436,7 +36467,7 @@
                 </a:tc>
                 <a:extLst>
                   <a:ext uri="{0D108BD9-81ED-4DB2-BD59-A6C34878D82A}">
-                    <a16:rowId xmlns:a16="http://schemas.microsoft.com/office/drawing/2014/main" xmlns="" val="10002"/>
+                    <a16:rowId xmlns="" xmlns:a16="http://schemas.microsoft.com/office/drawing/2014/main" val="10002"/>
                   </a:ext>
                 </a:extLst>
               </a:tr>
@@ -36587,7 +36618,7 @@
                 </a:tc>
                 <a:extLst>
                   <a:ext uri="{0D108BD9-81ED-4DB2-BD59-A6C34878D82A}">
-                    <a16:rowId xmlns:a16="http://schemas.microsoft.com/office/drawing/2014/main" xmlns="" val="10003"/>
+                    <a16:rowId xmlns="" xmlns:a16="http://schemas.microsoft.com/office/drawing/2014/main" val="10003"/>
                   </a:ext>
                 </a:extLst>
               </a:tr>
@@ -36738,7 +36769,7 @@
                 </a:tc>
                 <a:extLst>
                   <a:ext uri="{0D108BD9-81ED-4DB2-BD59-A6C34878D82A}">
-                    <a16:rowId xmlns:a16="http://schemas.microsoft.com/office/drawing/2014/main" xmlns="" val="10004"/>
+                    <a16:rowId xmlns="" xmlns:a16="http://schemas.microsoft.com/office/drawing/2014/main" val="10004"/>
                   </a:ext>
                 </a:extLst>
               </a:tr>
@@ -36889,7 +36920,7 @@
                 </a:tc>
                 <a:extLst>
                   <a:ext uri="{0D108BD9-81ED-4DB2-BD59-A6C34878D82A}">
-                    <a16:rowId xmlns:a16="http://schemas.microsoft.com/office/drawing/2014/main" xmlns="" val="10005"/>
+                    <a16:rowId xmlns="" xmlns:a16="http://schemas.microsoft.com/office/drawing/2014/main" val="10005"/>
                   </a:ext>
                 </a:extLst>
               </a:tr>
@@ -37040,7 +37071,7 @@
                 </a:tc>
                 <a:extLst>
                   <a:ext uri="{0D108BD9-81ED-4DB2-BD59-A6C34878D82A}">
-                    <a16:rowId xmlns:a16="http://schemas.microsoft.com/office/drawing/2014/main" xmlns="" val="10006"/>
+                    <a16:rowId xmlns="" xmlns:a16="http://schemas.microsoft.com/office/drawing/2014/main" val="10006"/>
                   </a:ext>
                 </a:extLst>
               </a:tr>
@@ -37191,7 +37222,7 @@
                 </a:tc>
                 <a:extLst>
                   <a:ext uri="{0D108BD9-81ED-4DB2-BD59-A6C34878D82A}">
-                    <a16:rowId xmlns:a16="http://schemas.microsoft.com/office/drawing/2014/main" xmlns="" val="10007"/>
+                    <a16:rowId xmlns="" xmlns:a16="http://schemas.microsoft.com/office/drawing/2014/main" val="10007"/>
                   </a:ext>
                 </a:extLst>
               </a:tr>
@@ -37342,7 +37373,7 @@
                 </a:tc>
                 <a:extLst>
                   <a:ext uri="{0D108BD9-81ED-4DB2-BD59-A6C34878D82A}">
-                    <a16:rowId xmlns:a16="http://schemas.microsoft.com/office/drawing/2014/main" xmlns="" val="10008"/>
+                    <a16:rowId xmlns="" xmlns:a16="http://schemas.microsoft.com/office/drawing/2014/main" val="10008"/>
                   </a:ext>
                 </a:extLst>
               </a:tr>
@@ -37493,7 +37524,7 @@
                 </a:tc>
                 <a:extLst>
                   <a:ext uri="{0D108BD9-81ED-4DB2-BD59-A6C34878D82A}">
-                    <a16:rowId xmlns:a16="http://schemas.microsoft.com/office/drawing/2014/main" xmlns="" val="10009"/>
+                    <a16:rowId xmlns="" xmlns:a16="http://schemas.microsoft.com/office/drawing/2014/main" val="10009"/>
                   </a:ext>
                 </a:extLst>
               </a:tr>
@@ -37644,7 +37675,7 @@
                 </a:tc>
                 <a:extLst>
                   <a:ext uri="{0D108BD9-81ED-4DB2-BD59-A6C34878D82A}">
-                    <a16:rowId xmlns:a16="http://schemas.microsoft.com/office/drawing/2014/main" xmlns="" val="10010"/>
+                    <a16:rowId xmlns="" xmlns:a16="http://schemas.microsoft.com/office/drawing/2014/main" val="10010"/>
                   </a:ext>
                 </a:extLst>
               </a:tr>
@@ -37795,7 +37826,7 @@
                 </a:tc>
                 <a:extLst>
                   <a:ext uri="{0D108BD9-81ED-4DB2-BD59-A6C34878D82A}">
-                    <a16:rowId xmlns:a16="http://schemas.microsoft.com/office/drawing/2014/main" xmlns="" val="10011"/>
+                    <a16:rowId xmlns="" xmlns:a16="http://schemas.microsoft.com/office/drawing/2014/main" val="10011"/>
                   </a:ext>
                 </a:extLst>
               </a:tr>
@@ -37946,7 +37977,7 @@
                 </a:tc>
                 <a:extLst>
                   <a:ext uri="{0D108BD9-81ED-4DB2-BD59-A6C34878D82A}">
-                    <a16:rowId xmlns:a16="http://schemas.microsoft.com/office/drawing/2014/main" xmlns="" val="10012"/>
+                    <a16:rowId xmlns="" xmlns:a16="http://schemas.microsoft.com/office/drawing/2014/main" val="10012"/>
                   </a:ext>
                 </a:extLst>
               </a:tr>
@@ -38097,7 +38128,7 @@
                 </a:tc>
                 <a:extLst>
                   <a:ext uri="{0D108BD9-81ED-4DB2-BD59-A6C34878D82A}">
-                    <a16:rowId xmlns:a16="http://schemas.microsoft.com/office/drawing/2014/main" xmlns="" val="10013"/>
+                    <a16:rowId xmlns="" xmlns:a16="http://schemas.microsoft.com/office/drawing/2014/main" val="10013"/>
                   </a:ext>
                 </a:extLst>
               </a:tr>
@@ -38248,7 +38279,7 @@
                 </a:tc>
                 <a:extLst>
                   <a:ext uri="{0D108BD9-81ED-4DB2-BD59-A6C34878D82A}">
-                    <a16:rowId xmlns:a16="http://schemas.microsoft.com/office/drawing/2014/main" xmlns="" val="10014"/>
+                    <a16:rowId xmlns="" xmlns:a16="http://schemas.microsoft.com/office/drawing/2014/main" val="10014"/>
                   </a:ext>
                 </a:extLst>
               </a:tr>
@@ -43530,6 +43561,40 @@
 </file>
 
 <file path=customXml/item1.xml><?xml version="1.0" encoding="utf-8"?>
+<p:properties xmlns:p="http://schemas.microsoft.com/office/2006/metadata/properties" xmlns:xsi="http://www.w3.org/2001/XMLSchema-instance" xmlns:pc="http://schemas.microsoft.com/office/infopath/2007/PartnerControls">
+  <documentManagement>
+    <_dlc_DocId xmlns="8e8c147c-4a44-4efb-abf1-e3af25080dca">NYTQRMT4MAHZ-1-73408</_dlc_DocId>
+    <_dlc_DocIdUrl xmlns="8e8c147c-4a44-4efb-abf1-e3af25080dca">
+      <Url>http://eportal.education2020.com/Curriculum/CMath/_layouts/DocIdRedir.aspx?ID=NYTQRMT4MAHZ-1-73408</Url>
+      <Description>NYTQRMT4MAHZ-1-73408</Description>
+    </_dlc_DocIdUrl>
+    <Target_x0020_Audiences xmlns="e488ce5d-f489-49a9-8091-c8b3fdc3ce56" xsi:nil="true"/>
+    <Order0 xmlns="e488ce5d-f489-49a9-8091-c8b3fdc3ce56" xsi:nil="true"/>
+    <TaxCatchAll xmlns="8e8c147c-4a44-4efb-abf1-e3af25080dca">
+      <Value>7432</Value>
+    </TaxCatchAll>
+    <TaxKeywordTaxHTField xmlns="8e8c147c-4a44-4efb-abf1-e3af25080dca">
+      <Terms xmlns="http://schemas.microsoft.com/office/infopath/2007/PartnerControls">
+        <TermInfo xmlns="http://schemas.microsoft.com/office/infopath/2007/PartnerControls">
+          <TermName xmlns="http://schemas.microsoft.com/office/infopath/2007/PartnerControls">Lesson Shell</TermName>
+          <TermId xmlns="http://schemas.microsoft.com/office/infopath/2007/PartnerControls">7b823159-1b76-4161-b004-4b1e873e8ffe</TermId>
+        </TermInfo>
+      </Terms>
+    </TaxKeywordTaxHTField>
+  </documentManagement>
+</p:properties>
+</file>
+
+<file path=customXml/item2.xml><?xml version="1.0" encoding="utf-8"?>
+<?mso-contentType ?>
+<FormTemplates xmlns="http://schemas.microsoft.com/sharepoint/v3/contenttype/forms">
+  <Display>DocumentLibraryForm</Display>
+  <Edit>DocumentLibraryForm</Edit>
+  <New>DocumentLibraryForm</New>
+</FormTemplates>
+</file>
+
+<file path=customXml/item3.xml><?xml version="1.0" encoding="utf-8"?>
 <?mso-contentType ?>
 <spe:Receivers xmlns:spe="http://schemas.microsoft.com/sharepoint/events">
   <Receiver>
@@ -43573,40 +43638,6 @@
     <Filter/>
   </Receiver>
 </spe:Receivers>
-</file>
-
-<file path=customXml/item2.xml><?xml version="1.0" encoding="utf-8"?>
-<?mso-contentType ?>
-<FormTemplates xmlns="http://schemas.microsoft.com/sharepoint/v3/contenttype/forms">
-  <Display>DocumentLibraryForm</Display>
-  <Edit>DocumentLibraryForm</Edit>
-  <New>DocumentLibraryForm</New>
-</FormTemplates>
-</file>
-
-<file path=customXml/item3.xml><?xml version="1.0" encoding="utf-8"?>
-<p:properties xmlns:p="http://schemas.microsoft.com/office/2006/metadata/properties" xmlns:xsi="http://www.w3.org/2001/XMLSchema-instance" xmlns:pc="http://schemas.microsoft.com/office/infopath/2007/PartnerControls">
-  <documentManagement>
-    <_dlc_DocId xmlns="8e8c147c-4a44-4efb-abf1-e3af25080dca">NYTQRMT4MAHZ-1-73408</_dlc_DocId>
-    <_dlc_DocIdUrl xmlns="8e8c147c-4a44-4efb-abf1-e3af25080dca">
-      <Url>http://eportal.education2020.com/Curriculum/CMath/_layouts/DocIdRedir.aspx?ID=NYTQRMT4MAHZ-1-73408</Url>
-      <Description>NYTQRMT4MAHZ-1-73408</Description>
-    </_dlc_DocIdUrl>
-    <Target_x0020_Audiences xmlns="e488ce5d-f489-49a9-8091-c8b3fdc3ce56" xsi:nil="true"/>
-    <Order0 xmlns="e488ce5d-f489-49a9-8091-c8b3fdc3ce56" xsi:nil="true"/>
-    <TaxCatchAll xmlns="8e8c147c-4a44-4efb-abf1-e3af25080dca">
-      <Value>7432</Value>
-    </TaxCatchAll>
-    <TaxKeywordTaxHTField xmlns="8e8c147c-4a44-4efb-abf1-e3af25080dca">
-      <Terms xmlns="http://schemas.microsoft.com/office/infopath/2007/PartnerControls">
-        <TermInfo xmlns="http://schemas.microsoft.com/office/infopath/2007/PartnerControls">
-          <TermName xmlns="http://schemas.microsoft.com/office/infopath/2007/PartnerControls">Lesson Shell</TermName>
-          <TermId xmlns="http://schemas.microsoft.com/office/infopath/2007/PartnerControls">7b823159-1b76-4161-b004-4b1e873e8ffe</TermId>
-        </TermInfo>
-      </Terms>
-    </TaxKeywordTaxHTField>
-  </documentManagement>
-</p:properties>
 </file>
 
 <file path=customXml/item4.xml><?xml version="1.0" encoding="utf-8"?>
@@ -43794,10 +43825,18 @@
 </file>
 
 <file path=customXml/itemProps1.xml><?xml version="1.0" encoding="utf-8"?>
-<ds:datastoreItem xmlns:ds="http://schemas.openxmlformats.org/officeDocument/2006/customXml" ds:itemID="{1EECF812-387C-4DE4-B9A3-9F7A72D3EC4A}">
+<ds:datastoreItem xmlns:ds="http://schemas.openxmlformats.org/officeDocument/2006/customXml" ds:itemID="{05D38530-3CCC-436F-BB00-72BDEC3E8657}">
   <ds:schemaRefs>
-    <ds:schemaRef ds:uri="http://schemas.microsoft.com/sharepoint/events"/>
-    <ds:schemaRef ds:uri="http://www.w3.org/2000/xmlns/"/>
+    <ds:schemaRef ds:uri="http://schemas.microsoft.com/office/2006/documentManagement/types"/>
+    <ds:schemaRef ds:uri="8e8c147c-4a44-4efb-abf1-e3af25080dca"/>
+    <ds:schemaRef ds:uri="e488ce5d-f489-49a9-8091-c8b3fdc3ce56"/>
+    <ds:schemaRef ds:uri="http://schemas.openxmlformats.org/package/2006/metadata/core-properties"/>
+    <ds:schemaRef ds:uri="http://purl.org/dc/dcmitype/"/>
+    <ds:schemaRef ds:uri="http://www.w3.org/XML/1998/namespace"/>
+    <ds:schemaRef ds:uri="http://purl.org/dc/terms/"/>
+    <ds:schemaRef ds:uri="http://schemas.microsoft.com/office/2006/metadata/properties"/>
+    <ds:schemaRef ds:uri="http://schemas.microsoft.com/office/infopath/2007/PartnerControls"/>
+    <ds:schemaRef ds:uri="http://purl.org/dc/elements/1.1/"/>
   </ds:schemaRefs>
 </ds:datastoreItem>
 </file>
@@ -43811,18 +43850,10 @@
 </file>
 
 <file path=customXml/itemProps3.xml><?xml version="1.0" encoding="utf-8"?>
-<ds:datastoreItem xmlns:ds="http://schemas.openxmlformats.org/officeDocument/2006/customXml" ds:itemID="{05D38530-3CCC-436F-BB00-72BDEC3E8657}">
+<ds:datastoreItem xmlns:ds="http://schemas.openxmlformats.org/officeDocument/2006/customXml" ds:itemID="{1EECF812-387C-4DE4-B9A3-9F7A72D3EC4A}">
   <ds:schemaRefs>
-    <ds:schemaRef ds:uri="http://schemas.microsoft.com/office/2006/documentManagement/types"/>
-    <ds:schemaRef ds:uri="8e8c147c-4a44-4efb-abf1-e3af25080dca"/>
-    <ds:schemaRef ds:uri="e488ce5d-f489-49a9-8091-c8b3fdc3ce56"/>
-    <ds:schemaRef ds:uri="http://schemas.openxmlformats.org/package/2006/metadata/core-properties"/>
-    <ds:schemaRef ds:uri="http://purl.org/dc/dcmitype/"/>
-    <ds:schemaRef ds:uri="http://www.w3.org/XML/1998/namespace"/>
-    <ds:schemaRef ds:uri="http://purl.org/dc/terms/"/>
-    <ds:schemaRef ds:uri="http://schemas.microsoft.com/office/2006/metadata/properties"/>
-    <ds:schemaRef ds:uri="http://schemas.microsoft.com/office/infopath/2007/PartnerControls"/>
-    <ds:schemaRef ds:uri="http://purl.org/dc/elements/1.1/"/>
+    <ds:schemaRef ds:uri="http://schemas.microsoft.com/sharepoint/events"/>
+    <ds:schemaRef ds:uri="http://www.w3.org/2000/xmlns/"/>
   </ds:schemaRefs>
 </ds:datastoreItem>
 </file>

</xml_diff>